<commit_message>
Update PDR with VGA information.
</commit_message>
<xml_diff>
--- a/PDR/Team7_PDR.pptx
+++ b/PDR/Team7_PDR.pptx
@@ -114,7 +114,27 @@
       </a:defRPr>
     </a:lvl9pPr>
   </p:defaultTextStyle>
+  <p:extLst>
+    <p:ext uri="{EFAFB233-063F-42B5-8137-9DF3F51BA10A}">
+      <p15:sldGuideLst xmlns:p15="http://schemas.microsoft.com/office/powerpoint/2012/main">
+        <p15:guide id="1" orient="horz" pos="2160">
+          <p15:clr>
+            <a:srgbClr val="A4A3A4"/>
+          </p15:clr>
+        </p15:guide>
+        <p15:guide id="2" pos="3840">
+          <p15:clr>
+            <a:srgbClr val="A4A3A4"/>
+          </p15:clr>
+        </p15:guide>
+      </p15:sldGuideLst>
+    </p:ext>
+  </p:extLst>
 </p:presentation>
+</file>
+
+<file path=ppt/revisionInfo.xml><?xml version="1.0" encoding="utf-8"?>
+<p1510:revInfo xmlns:a="http://schemas.openxmlformats.org/drawingml/2006/main" xmlns:r="http://schemas.openxmlformats.org/officeDocument/2006/relationships" xmlns:p1510="http://schemas.microsoft.com/office/powerpoint/2015/10/main"/>
 </file>
 
 <file path=ppt/slideLayouts/slideLayout1.xml><?xml version="1.0" encoding="utf-8"?>
@@ -425,7 +445,7 @@
           </a:lstStyle>
           <a:p>
             <a:r>
-              <a:rPr lang="en-US" smtClean="0"/>
+              <a:rPr lang="en-US"/>
               <a:t>Click to edit Master title style</a:t>
             </a:r>
             <a:endParaRPr lang="en-US" dirty="0"/>
@@ -496,7 +516,7 @@
           </a:lstStyle>
           <a:p>
             <a:r>
-              <a:rPr lang="en-US" smtClean="0"/>
+              <a:rPr lang="en-US"/>
               <a:t>Click to edit Master subtitle style</a:t>
             </a:r>
             <a:endParaRPr lang="en-US" dirty="0"/>
@@ -623,7 +643,7 @@
           <a:lstStyle/>
           <a:p>
             <a:r>
-              <a:rPr lang="en-US" smtClean="0"/>
+              <a:rPr lang="en-US"/>
               <a:t>Click to edit Master title style</a:t>
             </a:r>
             <a:endParaRPr lang="en-US" dirty="0"/>
@@ -647,35 +667,35 @@
           <a:p>
             <a:pPr lvl="0"/>
             <a:r>
-              <a:rPr lang="en-US" smtClean="0"/>
+              <a:rPr lang="en-US"/>
               <a:t>Click to edit Master text styles</a:t>
             </a:r>
           </a:p>
           <a:p>
             <a:pPr lvl="1"/>
             <a:r>
-              <a:rPr lang="en-US" smtClean="0"/>
+              <a:rPr lang="en-US"/>
               <a:t>Second level</a:t>
             </a:r>
           </a:p>
           <a:p>
             <a:pPr lvl="2"/>
             <a:r>
-              <a:rPr lang="en-US" smtClean="0"/>
+              <a:rPr lang="en-US"/>
               <a:t>Third level</a:t>
             </a:r>
           </a:p>
           <a:p>
             <a:pPr lvl="3"/>
             <a:r>
-              <a:rPr lang="en-US" smtClean="0"/>
+              <a:rPr lang="en-US"/>
               <a:t>Fourth level</a:t>
             </a:r>
           </a:p>
           <a:p>
             <a:pPr lvl="4"/>
             <a:r>
-              <a:rPr lang="en-US" smtClean="0"/>
+              <a:rPr lang="en-US"/>
               <a:t>Fifth level</a:t>
             </a:r>
             <a:endParaRPr lang="en-US" dirty="0"/>
@@ -798,7 +818,7 @@
           <a:lstStyle/>
           <a:p>
             <a:r>
-              <a:rPr lang="en-US" smtClean="0"/>
+              <a:rPr lang="en-US"/>
               <a:t>Click to edit Master title style</a:t>
             </a:r>
             <a:endParaRPr lang="en-US" dirty="0"/>
@@ -827,35 +847,35 @@
           <a:p>
             <a:pPr lvl="0"/>
             <a:r>
-              <a:rPr lang="en-US" smtClean="0"/>
+              <a:rPr lang="en-US"/>
               <a:t>Click to edit Master text styles</a:t>
             </a:r>
           </a:p>
           <a:p>
             <a:pPr lvl="1"/>
             <a:r>
-              <a:rPr lang="en-US" smtClean="0"/>
+              <a:rPr lang="en-US"/>
               <a:t>Second level</a:t>
             </a:r>
           </a:p>
           <a:p>
             <a:pPr lvl="2"/>
             <a:r>
-              <a:rPr lang="en-US" smtClean="0"/>
+              <a:rPr lang="en-US"/>
               <a:t>Third level</a:t>
             </a:r>
           </a:p>
           <a:p>
             <a:pPr lvl="3"/>
             <a:r>
-              <a:rPr lang="en-US" smtClean="0"/>
+              <a:rPr lang="en-US"/>
               <a:t>Fourth level</a:t>
             </a:r>
           </a:p>
           <a:p>
             <a:pPr lvl="4"/>
             <a:r>
-              <a:rPr lang="en-US" smtClean="0"/>
+              <a:rPr lang="en-US"/>
               <a:t>Fifth level</a:t>
             </a:r>
             <a:endParaRPr lang="en-US" dirty="0"/>
@@ -973,7 +993,7 @@
           <a:lstStyle/>
           <a:p>
             <a:r>
-              <a:rPr lang="en-US" smtClean="0"/>
+              <a:rPr lang="en-US"/>
               <a:t>Click to edit Master title style</a:t>
             </a:r>
             <a:endParaRPr lang="en-US" dirty="0"/>
@@ -997,35 +1017,35 @@
           <a:p>
             <a:pPr lvl="0"/>
             <a:r>
-              <a:rPr lang="en-US" smtClean="0"/>
+              <a:rPr lang="en-US"/>
               <a:t>Click to edit Master text styles</a:t>
             </a:r>
           </a:p>
           <a:p>
             <a:pPr lvl="1"/>
             <a:r>
-              <a:rPr lang="en-US" smtClean="0"/>
+              <a:rPr lang="en-US"/>
               <a:t>Second level</a:t>
             </a:r>
           </a:p>
           <a:p>
             <a:pPr lvl="2"/>
             <a:r>
-              <a:rPr lang="en-US" smtClean="0"/>
+              <a:rPr lang="en-US"/>
               <a:t>Third level</a:t>
             </a:r>
           </a:p>
           <a:p>
             <a:pPr lvl="3"/>
             <a:r>
-              <a:rPr lang="en-US" smtClean="0"/>
+              <a:rPr lang="en-US"/>
               <a:t>Fourth level</a:t>
             </a:r>
           </a:p>
           <a:p>
             <a:pPr lvl="4"/>
             <a:r>
-              <a:rPr lang="en-US" smtClean="0"/>
+              <a:rPr lang="en-US"/>
               <a:t>Fifth level</a:t>
             </a:r>
             <a:endParaRPr lang="en-US" dirty="0"/>
@@ -1214,7 +1234,7 @@
           </a:lstStyle>
           <a:p>
             <a:r>
-              <a:rPr lang="en-US" smtClean="0"/>
+              <a:rPr lang="en-US"/>
               <a:t>Click to edit Master title style</a:t>
             </a:r>
             <a:endParaRPr lang="en-US" dirty="0"/>
@@ -1334,7 +1354,7 @@
           <a:p>
             <a:pPr lvl="0"/>
             <a:r>
-              <a:rPr lang="en-US" smtClean="0"/>
+              <a:rPr lang="en-US"/>
               <a:t>Click to edit Master text styles</a:t>
             </a:r>
           </a:p>
@@ -1554,7 +1574,7 @@
           <a:lstStyle/>
           <a:p>
             <a:r>
-              <a:rPr lang="en-US" smtClean="0"/>
+              <a:rPr lang="en-US"/>
               <a:t>Click to edit Master title style</a:t>
             </a:r>
             <a:endParaRPr lang="en-US" dirty="0"/>
@@ -1611,35 +1631,35 @@
           <a:p>
             <a:pPr lvl="0"/>
             <a:r>
-              <a:rPr lang="en-US" smtClean="0"/>
+              <a:rPr lang="en-US"/>
               <a:t>Click to edit Master text styles</a:t>
             </a:r>
           </a:p>
           <a:p>
             <a:pPr lvl="1"/>
             <a:r>
-              <a:rPr lang="en-US" smtClean="0"/>
+              <a:rPr lang="en-US"/>
               <a:t>Second level</a:t>
             </a:r>
           </a:p>
           <a:p>
             <a:pPr lvl="2"/>
             <a:r>
-              <a:rPr lang="en-US" smtClean="0"/>
+              <a:rPr lang="en-US"/>
               <a:t>Third level</a:t>
             </a:r>
           </a:p>
           <a:p>
             <a:pPr lvl="3"/>
             <a:r>
-              <a:rPr lang="en-US" smtClean="0"/>
+              <a:rPr lang="en-US"/>
               <a:t>Fourth level</a:t>
             </a:r>
           </a:p>
           <a:p>
             <a:pPr lvl="4"/>
             <a:r>
-              <a:rPr lang="en-US" smtClean="0"/>
+              <a:rPr lang="en-US"/>
               <a:t>Fifth level</a:t>
             </a:r>
             <a:endParaRPr lang="en-US" dirty="0"/>
@@ -1696,35 +1716,35 @@
           <a:p>
             <a:pPr lvl="0"/>
             <a:r>
-              <a:rPr lang="en-US" smtClean="0"/>
+              <a:rPr lang="en-US"/>
               <a:t>Click to edit Master text styles</a:t>
             </a:r>
           </a:p>
           <a:p>
             <a:pPr lvl="1"/>
             <a:r>
-              <a:rPr lang="en-US" smtClean="0"/>
+              <a:rPr lang="en-US"/>
               <a:t>Second level</a:t>
             </a:r>
           </a:p>
           <a:p>
             <a:pPr lvl="2"/>
             <a:r>
-              <a:rPr lang="en-US" smtClean="0"/>
+              <a:rPr lang="en-US"/>
               <a:t>Third level</a:t>
             </a:r>
           </a:p>
           <a:p>
             <a:pPr lvl="3"/>
             <a:r>
-              <a:rPr lang="en-US" smtClean="0"/>
+              <a:rPr lang="en-US"/>
               <a:t>Fourth level</a:t>
             </a:r>
           </a:p>
           <a:p>
             <a:pPr lvl="4"/>
             <a:r>
-              <a:rPr lang="en-US" smtClean="0"/>
+              <a:rPr lang="en-US"/>
               <a:t>Fifth level</a:t>
             </a:r>
             <a:endParaRPr lang="en-US" dirty="0"/>
@@ -1842,7 +1862,7 @@
           <a:lstStyle/>
           <a:p>
             <a:r>
-              <a:rPr lang="en-US" smtClean="0"/>
+              <a:rPr lang="en-US"/>
               <a:t>Click to edit Master title style</a:t>
             </a:r>
             <a:endParaRPr lang="en-US" dirty="0"/>
@@ -1916,7 +1936,7 @@
           <a:p>
             <a:pPr lvl="0"/>
             <a:r>
-              <a:rPr lang="en-US" smtClean="0"/>
+              <a:rPr lang="en-US"/>
               <a:t>Click to edit Master text styles</a:t>
             </a:r>
           </a:p>
@@ -1972,35 +1992,35 @@
           <a:p>
             <a:pPr lvl="0"/>
             <a:r>
-              <a:rPr lang="en-US" smtClean="0"/>
+              <a:rPr lang="en-US"/>
               <a:t>Click to edit Master text styles</a:t>
             </a:r>
           </a:p>
           <a:p>
             <a:pPr lvl="1"/>
             <a:r>
-              <a:rPr lang="en-US" smtClean="0"/>
+              <a:rPr lang="en-US"/>
               <a:t>Second level</a:t>
             </a:r>
           </a:p>
           <a:p>
             <a:pPr lvl="2"/>
             <a:r>
-              <a:rPr lang="en-US" smtClean="0"/>
+              <a:rPr lang="en-US"/>
               <a:t>Third level</a:t>
             </a:r>
           </a:p>
           <a:p>
             <a:pPr lvl="3"/>
             <a:r>
-              <a:rPr lang="en-US" smtClean="0"/>
+              <a:rPr lang="en-US"/>
               <a:t>Fourth level</a:t>
             </a:r>
           </a:p>
           <a:p>
             <a:pPr lvl="4"/>
             <a:r>
-              <a:rPr lang="en-US" smtClean="0"/>
+              <a:rPr lang="en-US"/>
               <a:t>Fifth level</a:t>
             </a:r>
             <a:endParaRPr lang="en-US" dirty="0"/>
@@ -2074,7 +2094,7 @@
           <a:p>
             <a:pPr lvl="0"/>
             <a:r>
-              <a:rPr lang="en-US" smtClean="0"/>
+              <a:rPr lang="en-US"/>
               <a:t>Click to edit Master text styles</a:t>
             </a:r>
           </a:p>
@@ -2130,35 +2150,35 @@
           <a:p>
             <a:pPr lvl="0"/>
             <a:r>
-              <a:rPr lang="en-US" smtClean="0"/>
+              <a:rPr lang="en-US"/>
               <a:t>Click to edit Master text styles</a:t>
             </a:r>
           </a:p>
           <a:p>
             <a:pPr lvl="1"/>
             <a:r>
-              <a:rPr lang="en-US" smtClean="0"/>
+              <a:rPr lang="en-US"/>
               <a:t>Second level</a:t>
             </a:r>
           </a:p>
           <a:p>
             <a:pPr lvl="2"/>
             <a:r>
-              <a:rPr lang="en-US" smtClean="0"/>
+              <a:rPr lang="en-US"/>
               <a:t>Third level</a:t>
             </a:r>
           </a:p>
           <a:p>
             <a:pPr lvl="3"/>
             <a:r>
-              <a:rPr lang="en-US" smtClean="0"/>
+              <a:rPr lang="en-US"/>
               <a:t>Fourth level</a:t>
             </a:r>
           </a:p>
           <a:p>
             <a:pPr lvl="4"/>
             <a:r>
-              <a:rPr lang="en-US" smtClean="0"/>
+              <a:rPr lang="en-US"/>
               <a:t>Fifth level</a:t>
             </a:r>
             <a:endParaRPr lang="en-US" dirty="0"/>
@@ -2276,7 +2296,7 @@
           <a:lstStyle/>
           <a:p>
             <a:r>
-              <a:rPr lang="en-US" smtClean="0"/>
+              <a:rPr lang="en-US"/>
               <a:t>Click to edit Master title style</a:t>
             </a:r>
             <a:endParaRPr lang="en-US" dirty="0"/>
@@ -2557,7 +2577,7 @@
           </a:lstStyle>
           <a:p>
             <a:r>
-              <a:rPr lang="en-US" smtClean="0"/>
+              <a:rPr lang="en-US"/>
               <a:t>Click to edit Master title style</a:t>
             </a:r>
             <a:endParaRPr lang="en-US" dirty="0"/>
@@ -2614,35 +2634,35 @@
           <a:p>
             <a:pPr lvl="0"/>
             <a:r>
-              <a:rPr lang="en-US" smtClean="0"/>
+              <a:rPr lang="en-US"/>
               <a:t>Click to edit Master text styles</a:t>
             </a:r>
           </a:p>
           <a:p>
             <a:pPr lvl="1"/>
             <a:r>
-              <a:rPr lang="en-US" smtClean="0"/>
+              <a:rPr lang="en-US"/>
               <a:t>Second level</a:t>
             </a:r>
           </a:p>
           <a:p>
             <a:pPr lvl="2"/>
             <a:r>
-              <a:rPr lang="en-US" smtClean="0"/>
+              <a:rPr lang="en-US"/>
               <a:t>Third level</a:t>
             </a:r>
           </a:p>
           <a:p>
             <a:pPr lvl="3"/>
             <a:r>
-              <a:rPr lang="en-US" smtClean="0"/>
+              <a:rPr lang="en-US"/>
               <a:t>Fourth level</a:t>
             </a:r>
           </a:p>
           <a:p>
             <a:pPr lvl="4"/>
             <a:r>
-              <a:rPr lang="en-US" smtClean="0"/>
+              <a:rPr lang="en-US"/>
               <a:t>Fifth level</a:t>
             </a:r>
             <a:endParaRPr lang="en-US" dirty="0"/>
@@ -2722,7 +2742,7 @@
           <a:p>
             <a:pPr lvl="0"/>
             <a:r>
-              <a:rPr lang="en-US" smtClean="0"/>
+              <a:rPr lang="en-US"/>
               <a:t>Click to edit Master text styles</a:t>
             </a:r>
           </a:p>
@@ -2996,7 +3016,7 @@
           </a:lstStyle>
           <a:p>
             <a:r>
-              <a:rPr lang="en-US" smtClean="0"/>
+              <a:rPr lang="en-US"/>
               <a:t>Click to edit Master title style</a:t>
             </a:r>
             <a:endParaRPr lang="en-US" dirty="0"/>
@@ -3067,7 +3087,7 @@
           </a:lstStyle>
           <a:p>
             <a:r>
-              <a:rPr lang="en-US" smtClean="0"/>
+              <a:rPr lang="en-US"/>
               <a:t>Click icon to add picture</a:t>
             </a:r>
             <a:endParaRPr lang="en-US" dirty="0"/>
@@ -3147,7 +3167,7 @@
           <a:p>
             <a:pPr lvl="0"/>
             <a:r>
-              <a:rPr lang="en-US" smtClean="0"/>
+              <a:rPr lang="en-US"/>
               <a:t>Click to edit Master text styles</a:t>
             </a:r>
           </a:p>
@@ -3349,7 +3369,7 @@
           <a:lstStyle/>
           <a:p>
             <a:r>
-              <a:rPr lang="en-US" smtClean="0"/>
+              <a:rPr lang="en-US"/>
               <a:t>Click to edit Master title style</a:t>
             </a:r>
             <a:endParaRPr lang="en-US" dirty="0"/>
@@ -3383,35 +3403,35 @@
           <a:p>
             <a:pPr lvl="0"/>
             <a:r>
-              <a:rPr lang="en-US" smtClean="0"/>
+              <a:rPr lang="en-US"/>
               <a:t>Click to edit Master text styles</a:t>
             </a:r>
           </a:p>
           <a:p>
             <a:pPr lvl="1"/>
             <a:r>
-              <a:rPr lang="en-US" smtClean="0"/>
+              <a:rPr lang="en-US"/>
               <a:t>Second level</a:t>
             </a:r>
           </a:p>
           <a:p>
             <a:pPr lvl="2"/>
             <a:r>
-              <a:rPr lang="en-US" smtClean="0"/>
+              <a:rPr lang="en-US"/>
               <a:t>Third level</a:t>
             </a:r>
           </a:p>
           <a:p>
             <a:pPr lvl="3"/>
             <a:r>
-              <a:rPr lang="en-US" smtClean="0"/>
+              <a:rPr lang="en-US"/>
               <a:t>Fourth level</a:t>
             </a:r>
           </a:p>
           <a:p>
             <a:pPr lvl="4"/>
             <a:r>
-              <a:rPr lang="en-US" smtClean="0"/>
+              <a:rPr lang="en-US"/>
               <a:t>Fifth level</a:t>
             </a:r>
             <a:endParaRPr lang="en-US" dirty="0"/>
@@ -4043,24 +4063,23 @@
           <a:lstStyle/>
           <a:p>
             <a:r>
-              <a:rPr lang="en-US" sz="6600" dirty="0" smtClean="0"/>
+              <a:rPr lang="en-US" sz="6600" dirty="0"/>
               <a:t>VGA Transpose </a:t>
             </a:r>
             <a:br>
-              <a:rPr lang="en-US" sz="6600" dirty="0" smtClean="0"/>
+              <a:rPr lang="en-US" sz="6600" dirty="0"/>
             </a:br>
             <a:r>
-              <a:rPr lang="en-US" sz="6600" dirty="0" smtClean="0"/>
+              <a:rPr lang="en-US" sz="6600" dirty="0"/>
               <a:t>	and </a:t>
             </a:r>
             <a:br>
-              <a:rPr lang="en-US" sz="6600" dirty="0" smtClean="0"/>
+              <a:rPr lang="en-US" sz="6600" dirty="0"/>
             </a:br>
             <a:r>
-              <a:rPr lang="en-US" sz="6600" dirty="0" smtClean="0"/>
+              <a:rPr lang="en-US" sz="6600" dirty="0"/>
               <a:t>		Edge Detection</a:t>
             </a:r>
-            <a:endParaRPr lang="en-US" sz="6600" dirty="0"/>
           </a:p>
         </p:txBody>
       </p:sp>
@@ -4087,7 +4106,7 @@
           <a:lstStyle/>
           <a:p>
             <a:r>
-              <a:rPr lang="en-US" sz="1800" b="1" dirty="0" smtClean="0"/>
+              <a:rPr lang="en-US" sz="1800" b="1" dirty="0"/>
               <a:t>Team 7 - Distance Learning Students</a:t>
             </a:r>
           </a:p>
@@ -4108,7 +4127,7 @@
             </a:r>
             <a:r>
               <a:rPr lang="en-US" sz="1600" dirty="0"/>
-              <a:t>	- </a:t>
+              <a:t>	- GTID: 903124261</a:t>
             </a:r>
           </a:p>
           <a:p>
@@ -4122,7 +4141,6 @@
               <a:rPr lang="en-US" sz="1600" dirty="0"/>
               <a:t>Benjamin Sullins	- GTID: 903232988</a:t>
             </a:r>
-            <a:endParaRPr lang="en-US" sz="1600" dirty="0"/>
           </a:p>
         </p:txBody>
       </p:sp>
@@ -4136,13 +4154,6 @@
   <p:clrMapOvr>
     <a:masterClrMapping/>
   </p:clrMapOvr>
-  <p:timing>
-    <p:tnLst>
-      <p:par>
-        <p:cTn id="1" dur="indefinite" restart="never" nodeType="tmRoot"/>
-      </p:par>
-    </p:tnLst>
-  </p:timing>
 </p:sld>
 </file>
 
@@ -4341,10 +4352,9 @@
           <a:lstStyle/>
           <a:p>
             <a:r>
-              <a:rPr lang="en-US" dirty="0" smtClean="0"/>
+              <a:rPr lang="en-US" dirty="0"/>
               <a:t>Fake Camera Simulator</a:t>
             </a:r>
-            <a:endParaRPr lang="en-US" dirty="0"/>
           </a:p>
         </p:txBody>
       </p:sp>
@@ -4371,47 +4381,37 @@
           <a:lstStyle/>
           <a:p>
             <a:r>
-              <a:rPr lang="en-US" sz="1600" dirty="0" smtClean="0"/>
-              <a:t>Valid Pixels Per Line    : </a:t>
-            </a:r>
-            <a:r>
-              <a:rPr lang="en-US" sz="1600" dirty="0" smtClean="0"/>
-              <a:t>160</a:t>
-            </a:r>
-            <a:endParaRPr lang="en-US" sz="1600" dirty="0" smtClean="0"/>
-          </a:p>
-          <a:p>
-            <a:r>
-              <a:rPr lang="en-US" sz="1600" dirty="0" smtClean="0"/>
+              <a:rPr lang="en-US" sz="1600" dirty="0"/>
+              <a:t>Valid Pixels Per Line    : 160</a:t>
+            </a:r>
+          </a:p>
+          <a:p>
+            <a:r>
+              <a:rPr lang="en-US" sz="1600" dirty="0"/>
               <a:t>Invalid Pixels Per Line : 16</a:t>
             </a:r>
           </a:p>
           <a:p>
             <a:r>
-              <a:rPr lang="en-US" sz="1600" dirty="0" smtClean="0"/>
-              <a:t>Valid Lines                     : </a:t>
-            </a:r>
-            <a:r>
-              <a:rPr lang="en-US" sz="1600" dirty="0" smtClean="0"/>
-              <a:t>120</a:t>
-            </a:r>
-            <a:endParaRPr lang="en-US" sz="1600" dirty="0" smtClean="0"/>
-          </a:p>
-          <a:p>
-            <a:r>
-              <a:rPr lang="en-US" sz="1600" dirty="0" smtClean="0"/>
+              <a:rPr lang="en-US" sz="1600" dirty="0"/>
+              <a:t>Valid Lines                     : 120</a:t>
+            </a:r>
+          </a:p>
+          <a:p>
+            <a:r>
+              <a:rPr lang="en-US" sz="1600" dirty="0"/>
               <a:t>Pixel Clock                     : 50 MHz</a:t>
             </a:r>
           </a:p>
           <a:p>
             <a:r>
-              <a:rPr lang="en-US" sz="1600" dirty="0" smtClean="0"/>
+              <a:rPr lang="en-US" sz="1600" dirty="0"/>
               <a:t>Frame Rate                    : 50 Hz</a:t>
             </a:r>
           </a:p>
           <a:p>
             <a:r>
-              <a:rPr lang="en-US" sz="1600" dirty="0" smtClean="0"/>
+              <a:rPr lang="en-US" sz="1600" dirty="0"/>
               <a:t>Video Selection Changes Based On User DIP Switch Input</a:t>
             </a:r>
           </a:p>
@@ -4438,10 +4438,9 @@
           <a:lstStyle/>
           <a:p>
             <a:r>
-              <a:rPr lang="en-US" dirty="0" smtClean="0"/>
+              <a:rPr lang="en-US" dirty="0"/>
               <a:t>Transpose Circuit</a:t>
             </a:r>
-            <a:endParaRPr lang="en-US" dirty="0"/>
           </a:p>
         </p:txBody>
       </p:sp>
@@ -4471,17 +4470,12 @@
               <a:rPr lang="en-US" dirty="0"/>
               <a:t>Switch Logic Low: </a:t>
             </a:r>
-            <a:endParaRPr lang="en-US" dirty="0" smtClean="0"/>
           </a:p>
           <a:p>
             <a:pPr lvl="1"/>
             <a:r>
-              <a:rPr lang="en-US" dirty="0" smtClean="0"/>
-              <a:t>Original </a:t>
-            </a:r>
-            <a:r>
               <a:rPr lang="en-US" dirty="0"/>
-              <a:t>Image is Output</a:t>
+              <a:t>Original Image is Output</a:t>
             </a:r>
           </a:p>
           <a:p>
@@ -4489,17 +4483,12 @@
               <a:rPr lang="en-US" dirty="0"/>
               <a:t>Switch Logic High: </a:t>
             </a:r>
-            <a:endParaRPr lang="en-US" dirty="0" smtClean="0"/>
           </a:p>
           <a:p>
             <a:pPr lvl="1"/>
             <a:r>
-              <a:rPr lang="en-US" dirty="0" smtClean="0"/>
-              <a:t>Transpose </a:t>
-            </a:r>
-            <a:r>
               <a:rPr lang="en-US" dirty="0"/>
-              <a:t>Image is Output</a:t>
+              <a:t>Transpose Image is Output</a:t>
             </a:r>
           </a:p>
           <a:p>
@@ -6168,12 +6157,56 @@
           </a:lstStyle>
           <a:p>
             <a:r>
-              <a:rPr lang="en-US" dirty="0" smtClean="0"/>
-              <a:t>TODO</a:t>
-            </a:r>
-          </a:p>
-          <a:p>
-            <a:endParaRPr lang="en-US" dirty="0"/>
+              <a:rPr lang="en-US" sz="1400" dirty="0"/>
+              <a:t>640x480 @60Hz Output Resolution</a:t>
+            </a:r>
+          </a:p>
+          <a:p>
+            <a:pPr lvl="1"/>
+            <a:r>
+              <a:rPr lang="en-US" sz="1400" dirty="0"/>
+              <a:t>25.175 MHz Pixel Clock</a:t>
+            </a:r>
+          </a:p>
+          <a:p>
+            <a:r>
+              <a:rPr lang="en-US" sz="1400" dirty="0"/>
+              <a:t>Input Image Resolutions</a:t>
+            </a:r>
+          </a:p>
+          <a:p>
+            <a:pPr lvl="1"/>
+            <a:r>
+              <a:rPr lang="en-US" sz="1400" dirty="0"/>
+              <a:t>640x480, 320x240, 160x120</a:t>
+            </a:r>
+          </a:p>
+          <a:p>
+            <a:pPr lvl="1"/>
+            <a:r>
+              <a:rPr lang="en-US" sz="1400" dirty="0"/>
+              <a:t>Inputs Overwrite Image Buffer At</a:t>
+            </a:r>
+            <a:br>
+              <a:rPr lang="en-US" sz="1400" dirty="0"/>
+            </a:br>
+            <a:r>
+              <a:rPr lang="en-US" sz="1400" dirty="0"/>
+              <a:t>Input Clock Rate</a:t>
+            </a:r>
+          </a:p>
+          <a:p>
+            <a:r>
+              <a:rPr lang="en-US" sz="1400" dirty="0"/>
+              <a:t>4 Bit Greyscale Output</a:t>
+            </a:r>
+          </a:p>
+          <a:p>
+            <a:pPr lvl="1"/>
+            <a:r>
+              <a:rPr lang="en-US" sz="1400" dirty="0"/>
+              <a:t>Output From Image Buffer at Pixel Clock Rate</a:t>
+            </a:r>
           </a:p>
         </p:txBody>
       </p:sp>
@@ -6466,14 +6499,9 @@
           </a:p>
           <a:p>
             <a:r>
-              <a:rPr lang="en-US" sz="1600" dirty="0" smtClean="0"/>
-              <a:t>Output </a:t>
-            </a:r>
-            <a:r>
               <a:rPr lang="en-US" sz="1600" dirty="0"/>
-              <a:t>Select:   Vertical/Horizontal/Sum</a:t>
-            </a:r>
-            <a:endParaRPr lang="en-US" sz="1600" dirty="0" smtClean="0"/>
+              <a:t>Output Select:   Vertical/Horizontal/Sum</a:t>
+            </a:r>
           </a:p>
         </p:txBody>
       </p:sp>
@@ -6835,41 +6863,41 @@
           </a:lstStyle>
           <a:p>
             <a:r>
-              <a:rPr lang="en-US" dirty="0" smtClean="0"/>
+              <a:rPr lang="en-US" dirty="0"/>
               <a:t>Completed Design Will Provide:</a:t>
             </a:r>
           </a:p>
           <a:p>
             <a:pPr lvl="1"/>
             <a:r>
-              <a:rPr lang="en-US" dirty="0" smtClean="0"/>
+              <a:rPr lang="en-US" dirty="0"/>
               <a:t>User Selectable Video Output Options</a:t>
             </a:r>
           </a:p>
           <a:p>
             <a:pPr lvl="1"/>
             <a:r>
-              <a:rPr lang="en-US" dirty="0" smtClean="0"/>
+              <a:rPr lang="en-US" dirty="0"/>
               <a:t>On/Off Transpose</a:t>
             </a:r>
           </a:p>
           <a:p>
             <a:pPr lvl="1"/>
             <a:r>
-              <a:rPr lang="en-US" dirty="0" smtClean="0"/>
+              <a:rPr lang="en-US" dirty="0"/>
               <a:t>On/Off Edge Detection</a:t>
             </a:r>
           </a:p>
           <a:p>
             <a:pPr lvl="1"/>
             <a:r>
-              <a:rPr lang="en-US" dirty="0" smtClean="0"/>
+              <a:rPr lang="en-US" dirty="0"/>
               <a:t>VGA Formatted Video Output</a:t>
             </a:r>
           </a:p>
           <a:p>
             <a:pPr lvl="1"/>
-            <a:endParaRPr lang="en-US" dirty="0" smtClean="0"/>
+            <a:endParaRPr lang="en-US" dirty="0"/>
           </a:p>
         </p:txBody>
       </p:sp>
@@ -7153,10 +7181,9 @@
           <a:p>
             <a:pPr algn="ctr"/>
             <a:r>
-              <a:rPr lang="en-US" dirty="0" smtClean="0"/>
+              <a:rPr lang="en-US" dirty="0"/>
               <a:t>User DIP Switch Inputs</a:t>
             </a:r>
-            <a:endParaRPr lang="en-US" dirty="0"/>
           </a:p>
         </p:txBody>
       </p:sp>
@@ -7194,7 +7221,7 @@
           <a:lstStyle/>
           <a:p>
             <a:pPr algn="ctr"/>
-            <a:endParaRPr lang="en-US"/>
+            <a:endParaRPr lang="en-US" dirty="0"/>
           </a:p>
         </p:txBody>
       </p:sp>
@@ -7260,10 +7287,9 @@
           <a:p>
             <a:pPr algn="ctr"/>
             <a:r>
-              <a:rPr lang="en-US" dirty="0" smtClean="0"/>
+              <a:rPr lang="en-US" dirty="0"/>
               <a:t>Internal VHDL Firmware</a:t>
             </a:r>
-            <a:endParaRPr lang="en-US" dirty="0"/>
           </a:p>
         </p:txBody>
       </p:sp>
@@ -7291,10 +7317,9 @@
           <a:p>
             <a:pPr algn="ctr"/>
             <a:r>
-              <a:rPr lang="en-US" dirty="0" smtClean="0"/>
+              <a:rPr lang="en-US" dirty="0"/>
               <a:t>VGA Connector/Cable</a:t>
             </a:r>
-            <a:endParaRPr lang="en-US" dirty="0"/>
           </a:p>
         </p:txBody>
       </p:sp>
@@ -7322,10 +7347,9 @@
           <a:p>
             <a:pPr algn="ctr"/>
             <a:r>
-              <a:rPr lang="en-US" dirty="0" smtClean="0"/>
+              <a:rPr lang="en-US" dirty="0"/>
               <a:t>DIP Switch Inputs</a:t>
             </a:r>
-            <a:endParaRPr lang="en-US" dirty="0"/>
           </a:p>
         </p:txBody>
       </p:sp>
@@ -7353,10 +7377,9 @@
           <a:p>
             <a:pPr algn="ctr"/>
             <a:r>
-              <a:rPr lang="en-US" dirty="0" smtClean="0"/>
+              <a:rPr lang="en-US" dirty="0"/>
               <a:t>VGA Monitor</a:t>
             </a:r>
-            <a:endParaRPr lang="en-US" dirty="0"/>
           </a:p>
         </p:txBody>
       </p:sp>
@@ -7384,14 +7407,13 @@
           <a:p>
             <a:pPr algn="ctr"/>
             <a:r>
-              <a:rPr lang="en-US" dirty="0" err="1" smtClean="0"/>
+              <a:rPr lang="en-US" dirty="0" err="1"/>
               <a:t>Basys</a:t>
             </a:r>
             <a:r>
-              <a:rPr lang="en-US" dirty="0" smtClean="0"/>
+              <a:rPr lang="en-US" dirty="0"/>
               <a:t> 3 Board</a:t>
             </a:r>
-            <a:endParaRPr lang="en-US" dirty="0"/>
           </a:p>
         </p:txBody>
       </p:sp>
@@ -7665,7 +7687,7 @@
           <a:lstStyle/>
           <a:p>
             <a:pPr algn="ctr"/>
-            <a:endParaRPr lang="en-US" dirty="0" smtClean="0"/>
+            <a:endParaRPr lang="en-US" dirty="0"/>
           </a:p>
           <a:p>
             <a:pPr algn="ctr"/>
@@ -7673,7 +7695,7 @@
           </a:p>
           <a:p>
             <a:pPr algn="ctr"/>
-            <a:endParaRPr lang="en-US" dirty="0" smtClean="0"/>
+            <a:endParaRPr lang="en-US" dirty="0"/>
           </a:p>
           <a:p>
             <a:pPr algn="ctr"/>
@@ -7681,7 +7703,7 @@
           </a:p>
           <a:p>
             <a:pPr algn="ctr"/>
-            <a:endParaRPr lang="en-US" dirty="0" smtClean="0"/>
+            <a:endParaRPr lang="en-US" dirty="0"/>
           </a:p>
           <a:p>
             <a:pPr algn="ctr"/>
@@ -7689,7 +7711,7 @@
           </a:p>
           <a:p>
             <a:pPr algn="ctr"/>
-            <a:endParaRPr lang="en-US" dirty="0" smtClean="0"/>
+            <a:endParaRPr lang="en-US" dirty="0"/>
           </a:p>
           <a:p>
             <a:pPr algn="ctr"/>
@@ -7697,7 +7719,7 @@
           </a:p>
           <a:p>
             <a:pPr algn="ctr"/>
-            <a:endParaRPr lang="en-US" dirty="0" smtClean="0"/>
+            <a:endParaRPr lang="en-US" dirty="0"/>
           </a:p>
           <a:p>
             <a:pPr algn="ctr"/>
@@ -7705,19 +7727,18 @@
           </a:p>
           <a:p>
             <a:pPr algn="ctr"/>
-            <a:endParaRPr lang="en-US" dirty="0" smtClean="0"/>
+            <a:endParaRPr lang="en-US" dirty="0"/>
           </a:p>
           <a:p>
             <a:pPr algn="ctr"/>
             <a:r>
-              <a:rPr lang="en-US" dirty="0" err="1" smtClean="0"/>
+              <a:rPr lang="en-US" dirty="0" err="1"/>
               <a:t>Basys</a:t>
             </a:r>
             <a:r>
-              <a:rPr lang="en-US" dirty="0" smtClean="0"/>
+              <a:rPr lang="en-US" dirty="0"/>
               <a:t> 3 Development hardware</a:t>
             </a:r>
-            <a:endParaRPr lang="en-US" dirty="0"/>
           </a:p>
         </p:txBody>
       </p:sp>
@@ -7989,13 +8010,8 @@
           <a:p>
             <a:r>
               <a:rPr lang="en-US" dirty="0"/>
-              <a:t>Description</a:t>
-            </a:r>
-            <a:r>
-              <a:rPr lang="en-US" dirty="0" smtClean="0"/>
-              <a:t>:</a:t>
-            </a:r>
-            <a:endParaRPr lang="en-US" dirty="0"/>
+              <a:t>Description:</a:t>
+            </a:r>
           </a:p>
         </p:txBody>
       </p:sp>
@@ -8265,65 +8281,36 @@
           <a:p>
             <a:r>
               <a:rPr lang="en-US" dirty="0"/>
-              <a:t>Develop A </a:t>
-            </a:r>
-            <a:r>
-              <a:rPr lang="en-US" dirty="0" smtClean="0"/>
-              <a:t>Processing </a:t>
-            </a:r>
+              <a:t>Develop A Processing System For Generating Synthetic Images, Transposing, Detecting Edges, and Displaying Video To A VGA Monitor.</a:t>
+            </a:r>
+          </a:p>
+          <a:p>
             <a:r>
               <a:rPr lang="en-US" dirty="0"/>
-              <a:t>System For Generating Synthetic Images, Transposing, Detecting Edges, and Displaying </a:t>
-            </a:r>
-            <a:r>
-              <a:rPr lang="en-US" dirty="0" smtClean="0"/>
-              <a:t>Video To </a:t>
+              <a:t>Hardware Implemented On A </a:t>
+            </a:r>
+            <a:r>
+              <a:rPr lang="en-US" dirty="0" err="1"/>
+              <a:t>Basys</a:t>
             </a:r>
             <a:r>
               <a:rPr lang="en-US" dirty="0"/>
-              <a:t>A VGA </a:t>
-            </a:r>
-            <a:r>
-              <a:rPr lang="en-US" dirty="0" smtClean="0"/>
-              <a:t>Monitor.</a:t>
-            </a:r>
-          </a:p>
-          <a:p>
-            <a:r>
-              <a:rPr lang="en-US" dirty="0" smtClean="0"/>
-              <a:t>Hardware Implemented On A </a:t>
-            </a:r>
-            <a:r>
-              <a:rPr lang="en-US" dirty="0" err="1" smtClean="0"/>
-              <a:t>Basys</a:t>
-            </a:r>
-            <a:r>
-              <a:rPr lang="en-US" dirty="0" smtClean="0"/>
               <a:t> 3 Development Board</a:t>
             </a:r>
           </a:p>
           <a:p>
             <a:r>
-              <a:rPr lang="en-US" dirty="0" smtClean="0"/>
-              <a:t>Firmware Written In VHDL </a:t>
-            </a:r>
-            <a:r>
-              <a:rPr lang="en-US" dirty="0" smtClean="0"/>
-              <a:t>Within </a:t>
-            </a:r>
-            <a:r>
-              <a:rPr lang="en-US" dirty="0" err="1" smtClean="0"/>
+              <a:rPr lang="en-US" dirty="0"/>
+              <a:t>Firmware Written In VHDL Within </a:t>
+            </a:r>
+            <a:r>
+              <a:rPr lang="en-US" dirty="0" err="1"/>
               <a:t>Vivado</a:t>
             </a:r>
             <a:r>
-              <a:rPr lang="en-US" dirty="0" smtClean="0"/>
-              <a:t> </a:t>
-            </a:r>
-            <a:r>
-              <a:rPr lang="en-US" dirty="0" smtClean="0"/>
-              <a:t>2017.2</a:t>
-            </a:r>
-            <a:endParaRPr lang="en-US" dirty="0"/>
+              <a:rPr lang="en-US" dirty="0"/>
+              <a:t> 2017.2</a:t>
+            </a:r>
           </a:p>
         </p:txBody>
       </p:sp>
@@ -8369,10 +8356,9 @@
           <a:p>
             <a:pPr algn="ctr"/>
             <a:r>
-              <a:rPr lang="en-US" dirty="0" smtClean="0"/>
+              <a:rPr lang="en-US" dirty="0"/>
               <a:t>Fake Camera Simulator</a:t>
             </a:r>
-            <a:endParaRPr lang="en-US" dirty="0"/>
           </a:p>
         </p:txBody>
       </p:sp>
@@ -8418,10 +8404,9 @@
           <a:p>
             <a:pPr algn="ctr"/>
             <a:r>
-              <a:rPr lang="en-US" dirty="0" smtClean="0"/>
+              <a:rPr lang="en-US" dirty="0"/>
               <a:t>Transpose Circuit</a:t>
             </a:r>
-            <a:endParaRPr lang="en-US" dirty="0"/>
           </a:p>
         </p:txBody>
       </p:sp>
@@ -8467,10 +8452,9 @@
           <a:p>
             <a:pPr algn="ctr"/>
             <a:r>
-              <a:rPr lang="en-US" dirty="0" smtClean="0"/>
+              <a:rPr lang="en-US" dirty="0"/>
               <a:t>Edge Detection</a:t>
             </a:r>
-            <a:endParaRPr lang="en-US" dirty="0"/>
           </a:p>
         </p:txBody>
       </p:sp>
@@ -8516,10 +8500,9 @@
           <a:p>
             <a:pPr algn="ctr"/>
             <a:r>
-              <a:rPr lang="en-US" dirty="0" smtClean="0"/>
+              <a:rPr lang="en-US" dirty="0"/>
               <a:t>VGA Formatter</a:t>
             </a:r>
-            <a:endParaRPr lang="en-US" dirty="0"/>
           </a:p>
         </p:txBody>
       </p:sp>
@@ -8772,13 +8755,6 @@
   <p:clrMapOvr>
     <a:masterClrMapping/>
   </p:clrMapOvr>
-  <p:timing>
-    <p:tnLst>
-      <p:par>
-        <p:cTn id="1" dur="indefinite" restart="never" nodeType="tmRoot"/>
-      </p:par>
-    </p:tnLst>
-  </p:timing>
 </p:sld>
 </file>
 
@@ -8820,10 +8796,9 @@
           <a:lstStyle/>
           <a:p>
             <a:r>
-              <a:rPr lang="en-US" dirty="0" smtClean="0"/>
+              <a:rPr lang="en-US" dirty="0"/>
               <a:t>Subsystem Description</a:t>
             </a:r>
-            <a:endParaRPr lang="en-US" dirty="0"/>
           </a:p>
         </p:txBody>
       </p:sp>
@@ -8848,10 +8823,9 @@
           <a:lstStyle/>
           <a:p>
             <a:r>
-              <a:rPr lang="en-US" dirty="0" smtClean="0"/>
+              <a:rPr lang="en-US" dirty="0"/>
               <a:t>Fake Camera Simulator</a:t>
             </a:r>
-            <a:endParaRPr lang="en-US" dirty="0"/>
           </a:p>
         </p:txBody>
       </p:sp>
@@ -8878,74 +8852,68 @@
           <a:lstStyle/>
           <a:p>
             <a:r>
-              <a:rPr lang="en-US" dirty="0" smtClean="0"/>
+              <a:rPr lang="en-US" dirty="0"/>
               <a:t>Generate Synthetic Video</a:t>
             </a:r>
           </a:p>
           <a:p>
             <a:pPr lvl="1"/>
             <a:r>
-              <a:rPr lang="en-US" dirty="0" smtClean="0"/>
+              <a:rPr lang="en-US" dirty="0"/>
               <a:t>Horizontal Ramp Test Pattern</a:t>
             </a:r>
           </a:p>
           <a:p>
             <a:pPr lvl="1"/>
             <a:r>
-              <a:rPr lang="en-US" dirty="0" smtClean="0"/>
+              <a:rPr lang="en-US" dirty="0"/>
               <a:t>Vertical Ramp Test Pattern</a:t>
             </a:r>
           </a:p>
           <a:p>
             <a:pPr lvl="1"/>
             <a:r>
-              <a:rPr lang="en-US" dirty="0" smtClean="0"/>
+              <a:rPr lang="en-US" dirty="0"/>
               <a:t>Pre-Loaded Cropped Image</a:t>
             </a:r>
           </a:p>
           <a:p>
             <a:r>
-              <a:rPr lang="en-US" dirty="0" smtClean="0"/>
+              <a:rPr lang="en-US" dirty="0"/>
               <a:t>Replicates Real-Life Camera Output</a:t>
             </a:r>
           </a:p>
           <a:p>
             <a:pPr lvl="1"/>
             <a:r>
-              <a:rPr lang="en-US" dirty="0" err="1" smtClean="0"/>
+              <a:rPr lang="en-US" dirty="0" err="1"/>
               <a:t>CameraLink</a:t>
             </a:r>
             <a:r>
-              <a:rPr lang="en-US" dirty="0" smtClean="0"/>
+              <a:rPr lang="en-US" dirty="0"/>
               <a:t> Pixel Clock Rates - 50 MHz</a:t>
             </a:r>
           </a:p>
           <a:p>
             <a:pPr lvl="1"/>
             <a:r>
-              <a:rPr lang="en-US" dirty="0" smtClean="0"/>
-              <a:t>Image Size – </a:t>
-            </a:r>
-            <a:r>
-              <a:rPr lang="en-US" dirty="0" smtClean="0"/>
-              <a:t>160x120</a:t>
-            </a:r>
-            <a:endParaRPr lang="en-US" dirty="0" smtClean="0"/>
+              <a:rPr lang="en-US" dirty="0"/>
+              <a:t>Image Size – 160x120</a:t>
+            </a:r>
           </a:p>
           <a:p>
             <a:pPr lvl="1"/>
             <a:r>
-              <a:rPr lang="en-US" dirty="0" smtClean="0"/>
+              <a:rPr lang="en-US" dirty="0"/>
               <a:t>Frame Rate – 50 Hz</a:t>
             </a:r>
           </a:p>
           <a:p>
             <a:pPr lvl="1"/>
             <a:r>
-              <a:rPr lang="en-US" dirty="0" smtClean="0"/>
+              <a:rPr lang="en-US" dirty="0"/>
               <a:t>Monochrome</a:t>
             </a:r>
-            <a:endParaRPr lang="en-US" dirty="0"/>
           </a:p>
         </p:txBody>
       </p:sp>
@@ -8970,10 +8938,9 @@
           <a:lstStyle/>
           <a:p>
             <a:r>
-              <a:rPr lang="en-US" dirty="0" smtClean="0"/>
+              <a:rPr lang="en-US" dirty="0"/>
               <a:t>Transpose Circuit</a:t>
             </a:r>
-            <a:endParaRPr lang="en-US" dirty="0"/>
           </a:p>
         </p:txBody>
       </p:sp>
@@ -9000,66 +8967,41 @@
           <a:lstStyle/>
           <a:p>
             <a:r>
-              <a:rPr lang="en-US" dirty="0" smtClean="0"/>
+              <a:rPr lang="en-US" dirty="0"/>
               <a:t>Selectable Video Output</a:t>
             </a:r>
           </a:p>
           <a:p>
             <a:pPr lvl="1"/>
             <a:r>
-              <a:rPr lang="en-US" dirty="0" smtClean="0"/>
+              <a:rPr lang="en-US" dirty="0"/>
               <a:t>Non-Transposed</a:t>
             </a:r>
           </a:p>
           <a:p>
             <a:pPr lvl="1"/>
             <a:r>
-              <a:rPr lang="en-US" dirty="0" smtClean="0"/>
+              <a:rPr lang="en-US" dirty="0"/>
               <a:t>Transposed</a:t>
             </a:r>
           </a:p>
           <a:p>
             <a:r>
-              <a:rPr lang="en-US" dirty="0" smtClean="0"/>
-              <a:t>Retains </a:t>
-            </a:r>
-            <a:r>
-              <a:rPr lang="en-US" dirty="0" smtClean="0"/>
-              <a:t>Input Video </a:t>
-            </a:r>
-            <a:r>
-              <a:rPr lang="en-US" dirty="0" smtClean="0"/>
-              <a:t>Format</a:t>
-            </a:r>
-          </a:p>
-          <a:p>
-            <a:r>
-              <a:rPr lang="en-US" dirty="0" smtClean="0"/>
-              <a:t>Retains </a:t>
-            </a:r>
-            <a:r>
               <a:rPr lang="en-US" dirty="0"/>
-              <a:t>Input Video </a:t>
-            </a:r>
-            <a:r>
-              <a:rPr lang="en-US" dirty="0" smtClean="0"/>
-              <a:t>Frame Rate</a:t>
-            </a:r>
-          </a:p>
-          <a:p>
-            <a:r>
-              <a:rPr lang="en-US" dirty="0" smtClean="0"/>
-              <a:t>Retains </a:t>
-            </a:r>
+              <a:t>Retains Input Video Format</a:t>
+            </a:r>
+          </a:p>
+          <a:p>
             <a:r>
               <a:rPr lang="en-US" dirty="0"/>
-              <a:t>Input Video </a:t>
-            </a:r>
-            <a:r>
-              <a:rPr lang="en-US" dirty="0" smtClean="0"/>
-              <a:t>Pixel Clock Rate</a:t>
-            </a:r>
-            <a:endParaRPr lang="en-US" dirty="0"/>
+              <a:t>Retains Input Video Frame Rate</a:t>
+            </a:r>
+          </a:p>
+          <a:p>
+            <a:r>
+              <a:rPr lang="en-US" dirty="0"/>
+              <a:t>Retains Input Video Pixel Clock Rate</a:t>
+            </a:r>
           </a:p>
         </p:txBody>
       </p:sp>
@@ -9762,43 +9704,19 @@
           <a:p>
             <a:r>
               <a:rPr lang="en-US" dirty="0"/>
-              <a:t>Retains </a:t>
-            </a:r>
+              <a:t>Retains Input Video Format</a:t>
+            </a:r>
+          </a:p>
+          <a:p>
             <a:r>
               <a:rPr lang="en-US" dirty="0"/>
-              <a:t>Input Video </a:t>
-            </a:r>
+              <a:t>Retains Input Video Frame Rate</a:t>
+            </a:r>
+          </a:p>
+          <a:p>
             <a:r>
               <a:rPr lang="en-US" dirty="0"/>
-              <a:t>Format</a:t>
-            </a:r>
-          </a:p>
-          <a:p>
-            <a:r>
-              <a:rPr lang="en-US" dirty="0"/>
-              <a:t>Retains </a:t>
-            </a:r>
-            <a:r>
-              <a:rPr lang="en-US" dirty="0"/>
-              <a:t>Input Video </a:t>
-            </a:r>
-            <a:r>
-              <a:rPr lang="en-US" dirty="0"/>
-              <a:t>Frame Rate</a:t>
-            </a:r>
-          </a:p>
-          <a:p>
-            <a:r>
-              <a:rPr lang="en-US" dirty="0"/>
-              <a:t>Retains </a:t>
-            </a:r>
-            <a:r>
-              <a:rPr lang="en-US" dirty="0"/>
-              <a:t>Input Video </a:t>
-            </a:r>
-            <a:r>
-              <a:rPr lang="en-US" dirty="0"/>
-              <a:t>Pixel Clock Rate</a:t>
+              <a:t>Retains Input Video Pixel Clock Rate</a:t>
             </a:r>
           </a:p>
         </p:txBody>
@@ -10349,7 +10267,7 @@
             <a:pPr lvl="1"/>
             <a:r>
               <a:rPr lang="en-US" dirty="0"/>
-              <a:t>Pixel Clock Rate - 21.175 MHz</a:t>
+              <a:t>Pixel Clock Rate - 25.175 MHz</a:t>
             </a:r>
           </a:p>
           <a:p>
@@ -10657,13 +10575,6 @@
   <p:clrMapOvr>
     <a:masterClrMapping/>
   </p:clrMapOvr>
-  <p:timing>
-    <p:tnLst>
-      <p:par>
-        <p:cTn id="1" dur="indefinite" restart="never" nodeType="tmRoot"/>
-      </p:par>
-    </p:tnLst>
-  </p:timing>
 </p:sld>
 </file>
 
@@ -10823,10 +10734,9 @@
           <a:lstStyle/>
           <a:p>
             <a:r>
-              <a:rPr lang="en-US" dirty="0" smtClean="0"/>
+              <a:rPr lang="en-US" dirty="0"/>
               <a:t>Fake Camera Simulator</a:t>
             </a:r>
-            <a:endParaRPr lang="en-US" dirty="0"/>
           </a:p>
         </p:txBody>
       </p:sp>
@@ -10853,16 +10763,15 @@
           <a:lstStyle/>
           <a:p>
             <a:r>
-              <a:rPr lang="en-US" dirty="0" smtClean="0"/>
+              <a:rPr lang="en-US" dirty="0"/>
               <a:t>Consolidate Individual Frame FVAL/LVAL Control Signal Generations To Single Module</a:t>
             </a:r>
           </a:p>
           <a:p>
             <a:r>
-              <a:rPr lang="en-US" dirty="0" smtClean="0"/>
+              <a:rPr lang="en-US" dirty="0"/>
               <a:t>Reduce Resource Utilization For Horizontal/Vertical Ramp Test Pattern Data Generation </a:t>
             </a:r>
-            <a:endParaRPr lang="en-US" dirty="0"/>
           </a:p>
         </p:txBody>
       </p:sp>
@@ -10887,10 +10796,9 @@
           <a:lstStyle/>
           <a:p>
             <a:r>
-              <a:rPr lang="en-US" dirty="0" smtClean="0"/>
+              <a:rPr lang="en-US" dirty="0"/>
               <a:t>Transpose Circuit</a:t>
             </a:r>
-            <a:endParaRPr lang="en-US" dirty="0"/>
           </a:p>
         </p:txBody>
       </p:sp>
@@ -12596,7 +12504,6 @@
               <a:rPr lang="en-US" dirty="0"/>
               <a:t>Reduce Resource Utilization for Line-Buffers (IP BMG)</a:t>
             </a:r>
-            <a:endParaRPr lang="en-US" dirty="0"/>
           </a:p>
         </p:txBody>
       </p:sp>
@@ -12865,12 +12772,36 @@
           </a:lstStyle>
           <a:p>
             <a:r>
-              <a:rPr lang="en-US" dirty="0" smtClean="0"/>
-              <a:t>TODO</a:t>
-            </a:r>
-          </a:p>
-          <a:p>
-            <a:endParaRPr lang="en-US" dirty="0"/>
+              <a:rPr lang="en-US" dirty="0"/>
+              <a:t>Single Frame BRAM Due To</a:t>
+            </a:r>
+            <a:br>
+              <a:rPr lang="en-US" dirty="0"/>
+            </a:br>
+            <a:r>
+              <a:rPr lang="en-US" dirty="0"/>
+              <a:t>Mostly Static Images</a:t>
+            </a:r>
+          </a:p>
+          <a:p>
+            <a:r>
+              <a:rPr lang="en-US" dirty="0"/>
+              <a:t>Upscale Counters To Allow</a:t>
+            </a:r>
+            <a:br>
+              <a:rPr lang="en-US" dirty="0"/>
+            </a:br>
+            <a:r>
+              <a:rPr lang="en-US" dirty="0"/>
+              <a:t>Input Frames Smaller By </a:t>
+            </a:r>
+            <a:br>
+              <a:rPr lang="en-US" dirty="0"/>
+            </a:br>
+            <a:r>
+              <a:rPr lang="en-US" dirty="0"/>
+              <a:t>Powers Of 2</a:t>
+            </a:r>
           </a:p>
         </p:txBody>
       </p:sp>
@@ -12884,13 +12815,6 @@
   <p:clrMapOvr>
     <a:masterClrMapping/>
   </p:clrMapOvr>
-  <p:timing>
-    <p:tnLst>
-      <p:par>
-        <p:cTn id="1" dur="indefinite" restart="never" nodeType="tmRoot"/>
-      </p:par>
-    </p:tnLst>
-  </p:timing>
 </p:sld>
 </file>
 
@@ -12965,13 +12889,55 @@
                 </a:effectLst>
               </a:tblPr>
               <a:tblGrid>
-                <a:gridCol w="3761879"/>
-                <a:gridCol w="1238684"/>
-                <a:gridCol w="1238684"/>
-                <a:gridCol w="1238684"/>
-                <a:gridCol w="1238684"/>
-                <a:gridCol w="1238684"/>
-                <a:gridCol w="1238684"/>
+                <a:gridCol w="3761879">
+                  <a:extLst>
+                    <a:ext uri="{9D8B030D-6E8A-4147-A177-3AD203B41FA5}">
+                      <a16:colId xmlns:a16="http://schemas.microsoft.com/office/drawing/2014/main" val="20000"/>
+                    </a:ext>
+                  </a:extLst>
+                </a:gridCol>
+                <a:gridCol w="1238684">
+                  <a:extLst>
+                    <a:ext uri="{9D8B030D-6E8A-4147-A177-3AD203B41FA5}">
+                      <a16:colId xmlns:a16="http://schemas.microsoft.com/office/drawing/2014/main" val="20001"/>
+                    </a:ext>
+                  </a:extLst>
+                </a:gridCol>
+                <a:gridCol w="1238684">
+                  <a:extLst>
+                    <a:ext uri="{9D8B030D-6E8A-4147-A177-3AD203B41FA5}">
+                      <a16:colId xmlns:a16="http://schemas.microsoft.com/office/drawing/2014/main" val="20002"/>
+                    </a:ext>
+                  </a:extLst>
+                </a:gridCol>
+                <a:gridCol w="1238684">
+                  <a:extLst>
+                    <a:ext uri="{9D8B030D-6E8A-4147-A177-3AD203B41FA5}">
+                      <a16:colId xmlns:a16="http://schemas.microsoft.com/office/drawing/2014/main" val="20003"/>
+                    </a:ext>
+                  </a:extLst>
+                </a:gridCol>
+                <a:gridCol w="1238684">
+                  <a:extLst>
+                    <a:ext uri="{9D8B030D-6E8A-4147-A177-3AD203B41FA5}">
+                      <a16:colId xmlns:a16="http://schemas.microsoft.com/office/drawing/2014/main" val="20004"/>
+                    </a:ext>
+                  </a:extLst>
+                </a:gridCol>
+                <a:gridCol w="1238684">
+                  <a:extLst>
+                    <a:ext uri="{9D8B030D-6E8A-4147-A177-3AD203B41FA5}">
+                      <a16:colId xmlns:a16="http://schemas.microsoft.com/office/drawing/2014/main" val="20005"/>
+                    </a:ext>
+                  </a:extLst>
+                </a:gridCol>
+                <a:gridCol w="1238684">
+                  <a:extLst>
+                    <a:ext uri="{9D8B030D-6E8A-4147-A177-3AD203B41FA5}">
+                      <a16:colId xmlns:a16="http://schemas.microsoft.com/office/drawing/2014/main" val="20006"/>
+                    </a:ext>
+                  </a:extLst>
+                </a:gridCol>
               </a:tblGrid>
               <a:tr h="299001">
                 <a:tc>
@@ -13053,10 +13019,9 @@
                     </a:lstStyle>
                     <a:p>
                       <a:r>
-                        <a:rPr lang="en-US" sz="1000" dirty="0" smtClean="0"/>
+                        <a:rPr lang="en-US" sz="1000" dirty="0"/>
                         <a:t>Milestones</a:t>
                       </a:r>
-                      <a:endParaRPr lang="en-US" sz="1000" dirty="0"/>
                     </a:p>
                   </a:txBody>
                   <a:tcPr anchor="ctr">
@@ -13180,11 +13145,11 @@
                     <a:p>
                       <a:pPr algn="ctr"/>
                       <a:r>
-                        <a:rPr lang="en-US" sz="1000" dirty="0" smtClean="0"/>
+                        <a:rPr lang="en-US" sz="1000" dirty="0"/>
                         <a:t>Oct. 30</a:t>
                       </a:r>
                       <a:r>
-                        <a:rPr lang="en-US" sz="1000" baseline="30000" dirty="0" smtClean="0"/>
+                        <a:rPr lang="en-US" sz="1000" baseline="30000" dirty="0"/>
                         <a:t>th</a:t>
                       </a:r>
                       <a:endParaRPr lang="en-US" sz="1000" dirty="0"/>
@@ -13321,15 +13286,15 @@
                         <a:defRPr/>
                       </a:pPr>
                       <a:r>
-                        <a:rPr lang="en-US" sz="1000" dirty="0" smtClean="0"/>
+                        <a:rPr lang="en-US" sz="1000" dirty="0"/>
                         <a:t>Nov. 2</a:t>
                       </a:r>
                       <a:r>
-                        <a:rPr lang="en-US" sz="1000" baseline="30000" dirty="0" smtClean="0"/>
+                        <a:rPr lang="en-US" sz="1000" baseline="30000" dirty="0"/>
                         <a:t>nd</a:t>
                       </a:r>
                       <a:r>
-                        <a:rPr lang="en-US" sz="1000" dirty="0" smtClean="0"/>
+                        <a:rPr lang="en-US" sz="1000" dirty="0"/>
                         <a:t> </a:t>
                       </a:r>
                     </a:p>
@@ -13465,15 +13430,15 @@
                         <a:defRPr/>
                       </a:pPr>
                       <a:r>
-                        <a:rPr lang="en-US" sz="1000" dirty="0" smtClean="0"/>
+                        <a:rPr lang="en-US" sz="1000" dirty="0"/>
                         <a:t>Nov. 12</a:t>
                       </a:r>
                       <a:r>
-                        <a:rPr lang="en-US" sz="1000" baseline="30000" dirty="0" smtClean="0"/>
+                        <a:rPr lang="en-US" sz="1000" baseline="30000" dirty="0"/>
                         <a:t>th</a:t>
                       </a:r>
                       <a:r>
-                        <a:rPr lang="en-US" sz="1000" dirty="0" smtClean="0"/>
+                        <a:rPr lang="en-US" sz="1000" dirty="0"/>
                         <a:t> </a:t>
                       </a:r>
                     </a:p>
@@ -13593,18 +13558,17 @@
                     <a:p>
                       <a:pPr algn="ctr"/>
                       <a:r>
-                        <a:rPr lang="en-US" sz="1000" dirty="0" smtClean="0"/>
+                        <a:rPr lang="en-US" sz="1000" dirty="0"/>
                         <a:t>Nov. 19</a:t>
                       </a:r>
                       <a:r>
-                        <a:rPr lang="en-US" sz="1000" baseline="30000" dirty="0" smtClean="0"/>
+                        <a:rPr lang="en-US" sz="1000" baseline="30000" dirty="0"/>
                         <a:t>th</a:t>
                       </a:r>
                       <a:r>
-                        <a:rPr lang="en-US" sz="1000" dirty="0" smtClean="0"/>
+                        <a:rPr lang="en-US" sz="1000" dirty="0"/>
                         <a:t> </a:t>
                       </a:r>
-                      <a:endParaRPr lang="en-US" sz="1000" dirty="0"/>
                     </a:p>
                   </a:txBody>
                   <a:tcPr anchor="ctr">
@@ -13722,18 +13686,17 @@
                     <a:p>
                       <a:pPr algn="ctr"/>
                       <a:r>
-                        <a:rPr lang="en-US" sz="1000" dirty="0" smtClean="0"/>
+                        <a:rPr lang="en-US" sz="1000" dirty="0"/>
                         <a:t>Nov. 25</a:t>
                       </a:r>
                       <a:r>
-                        <a:rPr lang="en-US" sz="1000" baseline="30000" dirty="0" smtClean="0"/>
+                        <a:rPr lang="en-US" sz="1000" baseline="30000" dirty="0"/>
                         <a:t>th</a:t>
                       </a:r>
                       <a:r>
-                        <a:rPr lang="en-US" sz="1000" dirty="0" smtClean="0"/>
+                        <a:rPr lang="en-US" sz="1000" dirty="0"/>
                         <a:t> </a:t>
                       </a:r>
-                      <a:endParaRPr lang="en-US" sz="1000" dirty="0"/>
                     </a:p>
                   </a:txBody>
                   <a:tcPr anchor="ctr">
@@ -13851,18 +13814,17 @@
                     <a:p>
                       <a:pPr algn="ctr"/>
                       <a:r>
-                        <a:rPr lang="en-US" sz="1000" dirty="0" smtClean="0"/>
+                        <a:rPr lang="en-US" sz="1000" dirty="0"/>
                         <a:t>Nov. 30</a:t>
                       </a:r>
                       <a:r>
-                        <a:rPr lang="en-US" sz="1000" baseline="30000" dirty="0" smtClean="0"/>
+                        <a:rPr lang="en-US" sz="1000" baseline="30000" dirty="0"/>
                         <a:t>th</a:t>
                       </a:r>
                       <a:r>
-                        <a:rPr lang="en-US" sz="1000" dirty="0" smtClean="0"/>
+                        <a:rPr lang="en-US" sz="1000" dirty="0"/>
                         <a:t> </a:t>
                       </a:r>
-                      <a:endParaRPr lang="en-US" sz="1000" dirty="0"/>
                     </a:p>
                   </a:txBody>
                   <a:tcPr anchor="ctr">
@@ -13906,6 +13868,11 @@
                     </a:solidFill>
                   </a:tcPr>
                 </a:tc>
+                <a:extLst>
+                  <a:ext uri="{0D108BD9-81ED-4DB2-BD59-A6C34878D82A}">
+                    <a16:rowId xmlns:a16="http://schemas.microsoft.com/office/drawing/2014/main" val="10000"/>
+                  </a:ext>
+                </a:extLst>
               </a:tr>
               <a:tr h="330273">
                 <a:tc>
@@ -13987,11 +13954,11 @@
                     </a:lstStyle>
                     <a:p>
                       <a:r>
-                        <a:rPr lang="en-US" sz="1400" dirty="0" smtClean="0"/>
+                        <a:rPr lang="en-US" sz="1400" dirty="0"/>
                         <a:t>Requirements</a:t>
                       </a:r>
                       <a:r>
-                        <a:rPr lang="en-US" sz="1400" baseline="0" dirty="0" smtClean="0"/>
+                        <a:rPr lang="en-US" sz="1400" baseline="0" dirty="0"/>
                         <a:t> / Concept Design</a:t>
                       </a:r>
                       <a:endParaRPr lang="en-US" sz="1400" b="0" dirty="0"/>
@@ -14826,6 +14793,11 @@
                     </a:solidFill>
                   </a:tcPr>
                 </a:tc>
+                <a:extLst>
+                  <a:ext uri="{0D108BD9-81ED-4DB2-BD59-A6C34878D82A}">
+                    <a16:rowId xmlns:a16="http://schemas.microsoft.com/office/drawing/2014/main" val="10001"/>
+                  </a:ext>
+                </a:extLst>
               </a:tr>
               <a:tr h="336884">
                 <a:tc>
@@ -14924,10 +14896,10 @@
                         <a:defRPr/>
                       </a:pPr>
                       <a:r>
-                        <a:rPr lang="en-US" sz="1400" dirty="0" smtClean="0"/>
+                        <a:rPr lang="en-US" sz="1400" dirty="0"/>
                         <a:t>Sub-Module Design Capture</a:t>
                       </a:r>
-                      <a:endParaRPr lang="en-US" sz="1400" b="0" dirty="0" smtClean="0"/>
+                      <a:endParaRPr lang="en-US" sz="1400" b="0" dirty="0"/>
                     </a:p>
                   </a:txBody>
                   <a:tcPr anchor="ctr">
@@ -15752,6 +15724,11 @@
                     <a:noFill/>
                   </a:tcPr>
                 </a:tc>
+                <a:extLst>
+                  <a:ext uri="{0D108BD9-81ED-4DB2-BD59-A6C34878D82A}">
+                    <a16:rowId xmlns:a16="http://schemas.microsoft.com/office/drawing/2014/main" val="10002"/>
+                  </a:ext>
+                </a:extLst>
               </a:tr>
               <a:tr h="280737">
                 <a:tc>
@@ -15850,14 +15827,14 @@
                         <a:defRPr/>
                       </a:pPr>
                       <a:r>
-                        <a:rPr lang="en-US" sz="1400" dirty="0" smtClean="0"/>
+                        <a:rPr lang="en-US" sz="1400" dirty="0"/>
                         <a:t>Sub-Module</a:t>
                       </a:r>
                       <a:r>
-                        <a:rPr lang="en-US" sz="1400" baseline="0" dirty="0" smtClean="0"/>
+                        <a:rPr lang="en-US" sz="1400" baseline="0" dirty="0"/>
                         <a:t> Design Test and Peer Review</a:t>
                       </a:r>
-                      <a:endParaRPr lang="en-US" sz="1400" b="0" dirty="0" smtClean="0"/>
+                      <a:endParaRPr lang="en-US" sz="1400" b="0" dirty="0"/>
                     </a:p>
                   </a:txBody>
                   <a:tcPr anchor="ctr">
@@ -16710,6 +16687,11 @@
                     </a:solidFill>
                   </a:tcPr>
                 </a:tc>
+                <a:extLst>
+                  <a:ext uri="{0D108BD9-81ED-4DB2-BD59-A6C34878D82A}">
+                    <a16:rowId xmlns:a16="http://schemas.microsoft.com/office/drawing/2014/main" val="10003"/>
+                  </a:ext>
+                </a:extLst>
               </a:tr>
               <a:tr h="299001">
                 <a:tc>
@@ -16808,15 +16790,15 @@
                         <a:defRPr/>
                       </a:pPr>
                       <a:r>
-                        <a:rPr lang="en-US" sz="1400" b="0" dirty="0" smtClean="0"/>
+                        <a:rPr lang="en-US" sz="1400" b="0" dirty="0"/>
                         <a:t>Sub</a:t>
                       </a:r>
                       <a:r>
-                        <a:rPr lang="en-US" sz="1400" b="0" baseline="0" dirty="0" smtClean="0"/>
+                        <a:rPr lang="en-US" sz="1400" b="0" baseline="0" dirty="0"/>
                         <a:t>-Module </a:t>
                       </a:r>
                       <a:r>
-                        <a:rPr lang="en-US" sz="1400" b="0" dirty="0" smtClean="0"/>
+                        <a:rPr lang="en-US" sz="1400" b="0" dirty="0"/>
                         <a:t>Integration</a:t>
                       </a:r>
                     </a:p>
@@ -17664,6 +17646,11 @@
                     <a:noFill/>
                   </a:tcPr>
                 </a:tc>
+                <a:extLst>
+                  <a:ext uri="{0D108BD9-81ED-4DB2-BD59-A6C34878D82A}">
+                    <a16:rowId xmlns:a16="http://schemas.microsoft.com/office/drawing/2014/main" val="10004"/>
+                  </a:ext>
+                </a:extLst>
               </a:tr>
               <a:tr h="299001">
                 <a:tc>
@@ -17689,7 +17676,7 @@
                         <a:defRPr/>
                       </a:pPr>
                       <a:r>
-                        <a:rPr lang="en-US" sz="1400" b="0" kern="1200" dirty="0" smtClean="0">
+                        <a:rPr lang="en-US" sz="1400" b="0" kern="1200" dirty="0">
                           <a:solidFill>
                             <a:schemeClr val="dk1"/>
                           </a:solidFill>
@@ -18142,6 +18129,11 @@
                     <a:noFill/>
                   </a:tcPr>
                 </a:tc>
+                <a:extLst>
+                  <a:ext uri="{0D108BD9-81ED-4DB2-BD59-A6C34878D82A}">
+                    <a16:rowId xmlns:a16="http://schemas.microsoft.com/office/drawing/2014/main" val="10005"/>
+                  </a:ext>
+                </a:extLst>
               </a:tr>
               <a:tr h="299001">
                 <a:tc>
@@ -18167,7 +18159,7 @@
                         <a:defRPr/>
                       </a:pPr>
                       <a:r>
-                        <a:rPr lang="en-US" sz="1400" b="0" kern="1200" dirty="0" smtClean="0">
+                        <a:rPr lang="en-US" sz="1400" b="0" kern="1200" dirty="0">
                           <a:solidFill>
                             <a:schemeClr val="dk1"/>
                           </a:solidFill>
@@ -18620,6 +18612,11 @@
                     <a:noFill/>
                   </a:tcPr>
                 </a:tc>
+                <a:extLst>
+                  <a:ext uri="{0D108BD9-81ED-4DB2-BD59-A6C34878D82A}">
+                    <a16:rowId xmlns:a16="http://schemas.microsoft.com/office/drawing/2014/main" val="10006"/>
+                  </a:ext>
+                </a:extLst>
               </a:tr>
               <a:tr h="299001">
                 <a:tc>
@@ -18645,7 +18642,7 @@
                         <a:defRPr/>
                       </a:pPr>
                       <a:r>
-                        <a:rPr lang="en-US" sz="1400" b="0" kern="1200" dirty="0" smtClean="0">
+                        <a:rPr lang="en-US" sz="1400" b="0" kern="1200" dirty="0">
                           <a:solidFill>
                             <a:schemeClr val="dk1"/>
                           </a:solidFill>
@@ -19098,6 +19095,11 @@
                     <a:noFill/>
                   </a:tcPr>
                 </a:tc>
+                <a:extLst>
+                  <a:ext uri="{0D108BD9-81ED-4DB2-BD59-A6C34878D82A}">
+                    <a16:rowId xmlns:a16="http://schemas.microsoft.com/office/drawing/2014/main" val="10007"/>
+                  </a:ext>
+                </a:extLst>
               </a:tr>
               <a:tr h="299001">
                 <a:tc>
@@ -19123,7 +19125,7 @@
                         <a:defRPr/>
                       </a:pPr>
                       <a:r>
-                        <a:rPr lang="en-US" sz="1400" b="0" kern="1200" dirty="0" smtClean="0">
+                        <a:rPr lang="en-US" sz="1400" b="0" kern="1200" dirty="0">
                           <a:solidFill>
                             <a:schemeClr val="dk1"/>
                           </a:solidFill>
@@ -19555,6 +19557,11 @@
                     <a:noFill/>
                   </a:tcPr>
                 </a:tc>
+                <a:extLst>
+                  <a:ext uri="{0D108BD9-81ED-4DB2-BD59-A6C34878D82A}">
+                    <a16:rowId xmlns:a16="http://schemas.microsoft.com/office/drawing/2014/main" val="10008"/>
+                  </a:ext>
+                </a:extLst>
               </a:tr>
             </a:tbl>
           </a:graphicData>
@@ -19945,10 +19952,9 @@
           </a:lstStyle>
           <a:p>
             <a:r>
-              <a:rPr lang="en-US" dirty="0" smtClean="0"/>
+              <a:rPr lang="en-US" dirty="0"/>
               <a:t>Description:</a:t>
             </a:r>
-            <a:endParaRPr lang="en-US" dirty="0"/>
           </a:p>
         </p:txBody>
       </p:sp>
@@ -20487,10 +20493,9 @@
           </a:lstStyle>
           <a:p>
             <a:r>
-              <a:rPr lang="en-US" dirty="0" smtClean="0"/>
+              <a:rPr lang="en-US" dirty="0"/>
               <a:t>Work Assignments:</a:t>
             </a:r>
-            <a:endParaRPr lang="en-US" dirty="0"/>
           </a:p>
         </p:txBody>
       </p:sp>
@@ -20864,87 +20869,35 @@
           <a:lstStyle/>
           <a:p>
             <a:r>
-              <a:rPr lang="en-US" dirty="0" smtClean="0"/>
-              <a:t>Bryce </a:t>
-            </a:r>
-            <a:r>
               <a:rPr lang="en-US" dirty="0"/>
-              <a:t>Williams	</a:t>
-            </a:r>
-            <a:r>
-              <a:rPr lang="en-US" dirty="0" smtClean="0"/>
-              <a:t>: </a:t>
-            </a:r>
-            <a:r>
-              <a:rPr lang="en-US" dirty="0" smtClean="0"/>
-              <a:t> Edge </a:t>
-            </a:r>
-            <a:r>
-              <a:rPr lang="en-US" dirty="0" smtClean="0"/>
-              <a:t>Detection</a:t>
-            </a:r>
-            <a:endParaRPr lang="en-US" dirty="0"/>
-          </a:p>
-          <a:p>
-            <a:r>
-              <a:rPr lang="en-US" dirty="0" smtClean="0"/>
+              <a:t>Bryce Williams	:  Edge Detection</a:t>
+            </a:r>
+          </a:p>
+          <a:p>
+            <a:r>
+              <a:rPr lang="en-US" dirty="0"/>
               <a:t>Zachary </a:t>
             </a:r>
             <a:r>
-              <a:rPr lang="en-US" dirty="0" err="1" smtClean="0"/>
+              <a:rPr lang="en-US" dirty="0" err="1"/>
               <a:t>Boe</a:t>
             </a:r>
             <a:r>
               <a:rPr lang="en-US" dirty="0"/>
-              <a:t>		: </a:t>
-            </a:r>
-            <a:r>
-              <a:rPr lang="en-US" dirty="0" smtClean="0"/>
-              <a:t> VGA </a:t>
-            </a:r>
-            <a:r>
-              <a:rPr lang="en-US" dirty="0" smtClean="0"/>
-              <a:t>Formatter</a:t>
-            </a:r>
-            <a:endParaRPr lang="en-US" dirty="0"/>
-          </a:p>
-          <a:p>
-            <a:r>
-              <a:rPr lang="en-US" dirty="0" smtClean="0"/>
-              <a:t>Gregory Walls</a:t>
-            </a:r>
+              <a:t>		:  VGA Formatter</a:t>
+            </a:r>
+          </a:p>
+          <a:p>
             <a:r>
               <a:rPr lang="en-US" dirty="0"/>
-              <a:t>	: </a:t>
-            </a:r>
-            <a:r>
-              <a:rPr lang="en-US" dirty="0" smtClean="0"/>
-              <a:t> Transpose </a:t>
-            </a:r>
-            <a:r>
-              <a:rPr lang="en-US" dirty="0" smtClean="0"/>
-              <a:t>Circuit</a:t>
-            </a:r>
-            <a:endParaRPr lang="en-US" dirty="0"/>
-          </a:p>
-          <a:p>
-            <a:r>
-              <a:rPr lang="en-US" dirty="0" smtClean="0"/>
-              <a:t>Benjamin Sullins</a:t>
-            </a:r>
+              <a:t>Gregory Walls	:  Transpose Circuit</a:t>
+            </a:r>
+          </a:p>
+          <a:p>
             <a:r>
               <a:rPr lang="en-US" dirty="0"/>
-              <a:t>	: </a:t>
-            </a:r>
-            <a:r>
-              <a:rPr lang="en-US" dirty="0" smtClean="0"/>
-              <a:t> Fake </a:t>
-            </a:r>
-            <a:r>
-              <a:rPr lang="en-US" dirty="0" smtClean="0"/>
-              <a:t>Camera Sim.</a:t>
-            </a:r>
-            <a:endParaRPr lang="en-US" dirty="0"/>
+              <a:t>Benjamin Sullins	:  Fake Camera Sim.</a:t>
+            </a:r>
           </a:p>
         </p:txBody>
       </p:sp>
@@ -21052,7 +21005,7 @@
                 <a:buNone/>
                 <a:tabLst/>
               </a:pPr>
-              <a:endParaRPr kumimoji="0" lang="en-US" sz="1800" i="0" u="none" strike="noStrike" cap="none" normalizeH="0" baseline="0" dirty="0" smtClean="0">
+              <a:endParaRPr kumimoji="0" lang="en-US" sz="1800" i="0" u="none" strike="noStrike" cap="none" normalizeH="0" baseline="0" dirty="0">
                 <a:ln>
                   <a:noFill/>
                 </a:ln>
@@ -21208,7 +21161,7 @@
                 <a:buNone/>
                 <a:tabLst/>
               </a:pPr>
-              <a:endParaRPr kumimoji="0" lang="en-US" sz="1800" i="0" u="none" strike="noStrike" cap="none" normalizeH="0" baseline="0" dirty="0" smtClean="0">
+              <a:endParaRPr kumimoji="0" lang="en-US" sz="1800" i="0" u="none" strike="noStrike" cap="none" normalizeH="0" baseline="0" dirty="0">
                 <a:ln>
                   <a:noFill/>
                 </a:ln>
@@ -21502,7 +21455,7 @@
                 <a:buNone/>
                 <a:tabLst/>
               </a:pPr>
-              <a:endParaRPr kumimoji="0" lang="en-US" sz="1800" i="0" u="none" strike="noStrike" cap="none" normalizeH="0" baseline="0" dirty="0" smtClean="0">
+              <a:endParaRPr kumimoji="0" lang="en-US" sz="1800" i="0" u="none" strike="noStrike" cap="none" normalizeH="0" baseline="0" dirty="0">
                 <a:ln>
                   <a:noFill/>
                 </a:ln>
@@ -21658,7 +21611,7 @@
                 <a:buNone/>
                 <a:tabLst/>
               </a:pPr>
-              <a:endParaRPr kumimoji="0" lang="en-US" sz="1800" i="0" u="none" strike="noStrike" cap="none" normalizeH="0" baseline="0" dirty="0" smtClean="0">
+              <a:endParaRPr kumimoji="0" lang="en-US" sz="1800" i="0" u="none" strike="noStrike" cap="none" normalizeH="0" baseline="0" dirty="0">
                 <a:ln>
                   <a:noFill/>
                 </a:ln>
@@ -22210,26 +22163,9 @@
             <a:lstStyle/>
             <a:p>
               <a:r>
-                <a:rPr lang="en-US" dirty="0" smtClean="0"/>
-                <a:t>Legend: </a:t>
+                <a:rPr lang="en-US" dirty="0"/>
+                <a:t>Legend:                          Complete                          Incomplete       (Milestones – All Team Members)</a:t>
               </a:r>
-              <a:r>
-                <a:rPr lang="en-US" dirty="0" smtClean="0"/>
-                <a:t>                         </a:t>
-              </a:r>
-              <a:r>
-                <a:rPr lang="en-US" dirty="0" smtClean="0"/>
-                <a:t>Complete  </a:t>
-              </a:r>
-              <a:r>
-                <a:rPr lang="en-US" dirty="0" smtClean="0"/>
-                <a:t>                        </a:t>
-              </a:r>
-              <a:r>
-                <a:rPr lang="en-US" dirty="0" smtClean="0"/>
-                <a:t>Incomplete       (Milestones – All Team Members)</a:t>
-              </a:r>
-              <a:endParaRPr lang="en-US" dirty="0"/>
             </a:p>
           </p:txBody>
         </p:sp>
@@ -22299,7 +22235,7 @@
                   <a:buNone/>
                   <a:tabLst/>
                 </a:pPr>
-                <a:endParaRPr kumimoji="0" lang="en-US" sz="1800" i="0" u="none" strike="noStrike" cap="none" normalizeH="0" baseline="0" dirty="0" smtClean="0">
+                <a:endParaRPr kumimoji="0" lang="en-US" sz="1800" i="0" u="none" strike="noStrike" cap="none" normalizeH="0" baseline="0" dirty="0">
                   <a:ln>
                     <a:noFill/>
                   </a:ln>
@@ -22697,10 +22633,9 @@
           <a:lstStyle/>
           <a:p>
             <a:r>
-              <a:rPr lang="en-US" dirty="0" smtClean="0"/>
+              <a:rPr lang="en-US" dirty="0"/>
               <a:t>Fake Camera Simulator</a:t>
             </a:r>
-            <a:endParaRPr lang="en-US" dirty="0"/>
           </a:p>
         </p:txBody>
       </p:sp>
@@ -22727,32 +22662,31 @@
           <a:lstStyle/>
           <a:p>
             <a:r>
-              <a:rPr lang="en-US" dirty="0" smtClean="0"/>
+              <a:rPr lang="en-US" dirty="0"/>
               <a:t>Horizontal/Vertical Ramp Test Pattern Generation Simulated With </a:t>
             </a:r>
             <a:r>
-              <a:rPr lang="en-US" dirty="0" err="1" smtClean="0"/>
+              <a:rPr lang="en-US" dirty="0" err="1"/>
               <a:t>Matlab</a:t>
             </a:r>
-            <a:endParaRPr lang="en-US" dirty="0" smtClean="0"/>
-          </a:p>
-          <a:p>
-            <a:r>
-              <a:rPr lang="en-US" dirty="0" smtClean="0"/>
+            <a:endParaRPr lang="en-US" dirty="0"/>
+          </a:p>
+          <a:p>
+            <a:r>
+              <a:rPr lang="en-US" dirty="0"/>
               <a:t>Pre-Loaded Cropped Image Simulated With </a:t>
             </a:r>
             <a:r>
-              <a:rPr lang="en-US" dirty="0" err="1" smtClean="0"/>
+              <a:rPr lang="en-US" dirty="0" err="1"/>
               <a:t>Matlab</a:t>
             </a:r>
-            <a:endParaRPr lang="en-US" dirty="0" smtClean="0"/>
-          </a:p>
-          <a:p>
-            <a:r>
-              <a:rPr lang="en-US" dirty="0" smtClean="0"/>
+            <a:endParaRPr lang="en-US" dirty="0"/>
+          </a:p>
+          <a:p>
+            <a:r>
+              <a:rPr lang="en-US" dirty="0"/>
               <a:t>All Data Output Options Simulated With ISIM</a:t>
             </a:r>
-            <a:endParaRPr lang="en-US" dirty="0"/>
           </a:p>
         </p:txBody>
       </p:sp>
@@ -22777,10 +22711,9 @@
           <a:lstStyle/>
           <a:p>
             <a:r>
-              <a:rPr lang="en-US" dirty="0" smtClean="0"/>
+              <a:rPr lang="en-US" dirty="0"/>
               <a:t>Transpose Circuit</a:t>
             </a:r>
-            <a:endParaRPr lang="en-US" dirty="0"/>
           </a:p>
         </p:txBody>
       </p:sp>
@@ -22807,18 +22740,14 @@
           <a:lstStyle/>
           <a:p>
             <a:r>
-              <a:rPr lang="en-US" dirty="0" smtClean="0"/>
+              <a:rPr lang="en-US" dirty="0"/>
               <a:t>ISIM Code Verification Using Synthetic Images</a:t>
             </a:r>
           </a:p>
           <a:p>
             <a:r>
-              <a:rPr lang="en-US" dirty="0" smtClean="0"/>
-              <a:t>Use </a:t>
-            </a:r>
-            <a:r>
               <a:rPr lang="en-US" dirty="0"/>
-              <a:t>VGA Monitor to Visually Verify Correct Functionality</a:t>
+              <a:t>Use VGA Monitor to Visually Verify Correct Functionality</a:t>
             </a:r>
           </a:p>
           <a:p>
@@ -24502,7 +24431,6 @@
               <a:rPr lang="en-US" dirty="0"/>
               <a:t>MATLAB Post-Processing of VHDL Simulation Output Data</a:t>
             </a:r>
-            <a:endParaRPr lang="en-US" dirty="0"/>
           </a:p>
         </p:txBody>
       </p:sp>
@@ -24771,12 +24699,43 @@
           </a:lstStyle>
           <a:p>
             <a:r>
-              <a:rPr lang="en-US" dirty="0" smtClean="0"/>
-              <a:t>TODO</a:t>
-            </a:r>
-          </a:p>
-          <a:p>
-            <a:endParaRPr lang="en-US" dirty="0"/>
+              <a:rPr lang="en-US" dirty="0"/>
+              <a:t>VGA Sync Signals Simulated</a:t>
+            </a:r>
+            <a:br>
+              <a:rPr lang="en-US" dirty="0"/>
+            </a:br>
+            <a:r>
+              <a:rPr lang="en-US" dirty="0"/>
+              <a:t>With ISIM</a:t>
+            </a:r>
+          </a:p>
+          <a:p>
+            <a:r>
+              <a:rPr lang="en-US" dirty="0"/>
+              <a:t>VGA Monitor Output</a:t>
+            </a:r>
+          </a:p>
+          <a:p>
+            <a:r>
+              <a:rPr lang="en-US" dirty="0"/>
+              <a:t>Reference </a:t>
+            </a:r>
+            <a:r>
+              <a:rPr lang="en-US" dirty="0" err="1"/>
+              <a:t>Digilent</a:t>
+            </a:r>
+            <a:r>
+              <a:rPr lang="en-US" dirty="0"/>
+              <a:t> Basys3</a:t>
+            </a:r>
+            <a:br>
+              <a:rPr lang="en-US" dirty="0"/>
+            </a:br>
+            <a:r>
+              <a:rPr lang="en-US" dirty="0"/>
+              <a:t>GPIO Demo Project</a:t>
+            </a:r>
           </a:p>
         </p:txBody>
       </p:sp>
@@ -24790,13 +24749,6 @@
   <p:clrMapOvr>
     <a:masterClrMapping/>
   </p:clrMapOvr>
-  <p:timing>
-    <p:tnLst>
-      <p:par>
-        <p:cTn id="1" dur="indefinite" restart="never" nodeType="tmRoot"/>
-      </p:par>
-    </p:tnLst>
-  </p:timing>
 </p:sld>
 </file>
 
@@ -24838,10 +24790,9 @@
           <a:lstStyle/>
           <a:p>
             <a:r>
-              <a:rPr lang="en-US" dirty="0" smtClean="0"/>
+              <a:rPr lang="en-US" dirty="0"/>
               <a:t>Fake Camera Simulator</a:t>
             </a:r>
-            <a:endParaRPr lang="en-US" dirty="0"/>
           </a:p>
         </p:txBody>
       </p:sp>
@@ -24868,11 +24819,11 @@
           <a:lstStyle/>
           <a:p>
             <a:r>
-              <a:rPr lang="en-US" dirty="0" err="1" smtClean="0"/>
+              <a:rPr lang="en-US" dirty="0" err="1"/>
               <a:t>CameraLink</a:t>
             </a:r>
             <a:r>
-              <a:rPr lang="en-US" dirty="0" smtClean="0"/>
+              <a:rPr lang="en-US" dirty="0"/>
               <a:t> Standard</a:t>
             </a:r>
           </a:p>
@@ -24882,64 +24833,34 @@
               <a:rPr lang="en-US" dirty="0">
                 <a:hlinkClick r:id="rId2"/>
               </a:rPr>
-              <a:t>http://</a:t>
-            </a:r>
-            <a:r>
-              <a:rPr lang="en-US" dirty="0" smtClean="0">
-                <a:hlinkClick r:id="rId2"/>
-              </a:rPr>
-              <a:t>www.imagelabs.com/wp-content/uploads/2010/10/CameraLink5.pdf</a:t>
-            </a:r>
-            <a:endParaRPr lang="en-US" dirty="0" smtClean="0"/>
+              <a:t>http://www.imagelabs.com/wp-content/uploads/2010/10/CameraLink5.pdf</a:t>
+            </a:r>
+            <a:endParaRPr lang="en-US" dirty="0"/>
           </a:p>
           <a:p>
             <a:pPr lvl="1"/>
             <a:r>
-              <a:rPr lang="en-US" dirty="0" smtClean="0"/>
+              <a:rPr lang="en-US" dirty="0"/>
               <a:t>Defines Commercial Video Transmission Standard Used By Large Varieties Of Cameras</a:t>
             </a:r>
           </a:p>
           <a:p>
             <a:pPr lvl="1"/>
             <a:r>
-              <a:rPr lang="en-US" dirty="0" smtClean="0"/>
+              <a:rPr lang="en-US" dirty="0"/>
               <a:t>Defines Allowable Pixel Clock Range 25-85 MHz</a:t>
             </a:r>
           </a:p>
           <a:p>
             <a:pPr lvl="1"/>
             <a:r>
-              <a:rPr lang="en-US" dirty="0" smtClean="0"/>
-              <a:t>“</a:t>
-            </a:r>
-            <a:r>
               <a:rPr lang="en-US" dirty="0"/>
-              <a:t>Camera Link is a communication interface for vision applications. </a:t>
-            </a:r>
-            <a:r>
-              <a:rPr lang="en-US" dirty="0" smtClean="0"/>
-              <a:t>The interface extends the </a:t>
-            </a:r>
+              <a:t>“Camera Link is a communication interface for vision applications. The interface extends the base technology of Channel Link to provide a specification more useful for vision applications.”</a:t>
+            </a:r>
+          </a:p>
+          <a:p>
             <a:r>
               <a:rPr lang="en-US" dirty="0"/>
-              <a:t>base technology of Channel Link to provide </a:t>
-            </a:r>
-            <a:r>
-              <a:rPr lang="en-US" dirty="0" smtClean="0"/>
-              <a:t>a specification </a:t>
-            </a:r>
-            <a:r>
-              <a:rPr lang="en-US" dirty="0"/>
-              <a:t>more useful for </a:t>
-            </a:r>
-            <a:r>
-              <a:rPr lang="en-US" dirty="0" smtClean="0"/>
-              <a:t>vision applications.”</a:t>
-            </a:r>
-          </a:p>
-          <a:p>
-            <a:r>
-              <a:rPr lang="en-US" dirty="0" smtClean="0"/>
               <a:t>Frame Control Signals</a:t>
             </a:r>
           </a:p>
@@ -24949,63 +24870,49 @@
               <a:rPr lang="en-US" dirty="0">
                 <a:hlinkClick r:id="rId3"/>
               </a:rPr>
-              <a:t>https://</a:t>
-            </a:r>
-            <a:r>
-              <a:rPr lang="en-US" dirty="0" smtClean="0">
-                <a:hlinkClick r:id="rId3"/>
-              </a:rPr>
-              <a:t>www.imperx.com/wp-content/uploads/Member/Whitepapers/camera_link.ppt</a:t>
-            </a:r>
-            <a:endParaRPr lang="en-US" dirty="0" smtClean="0"/>
+              <a:t>https://www.imperx.com/wp-content/uploads/Member/Whitepapers/camera_link.ppt</a:t>
+            </a:r>
+            <a:endParaRPr lang="en-US" dirty="0"/>
           </a:p>
           <a:p>
             <a:pPr lvl="1"/>
             <a:r>
-              <a:rPr lang="en-US" dirty="0" smtClean="0"/>
+              <a:rPr lang="en-US" dirty="0"/>
               <a:t>Standard Framing Strobes Used For Video Output</a:t>
             </a:r>
           </a:p>
           <a:p>
             <a:pPr lvl="1"/>
             <a:r>
-              <a:rPr lang="en-US" dirty="0" smtClean="0"/>
+              <a:rPr lang="en-US" dirty="0"/>
               <a:t>Used Widespread Across Commercial Cameras</a:t>
             </a:r>
           </a:p>
           <a:p>
             <a:pPr lvl="1"/>
             <a:r>
-              <a:rPr lang="en-US" dirty="0" err="1" smtClean="0"/>
+              <a:rPr lang="en-US" dirty="0" err="1"/>
               <a:t>CameraLink</a:t>
             </a:r>
             <a:r>
-              <a:rPr lang="en-US" dirty="0" smtClean="0"/>
+              <a:rPr lang="en-US" dirty="0"/>
               <a:t> Protocol Supported</a:t>
             </a:r>
           </a:p>
           <a:p>
             <a:pPr lvl="2"/>
             <a:r>
-              <a:rPr lang="en-US" dirty="0" smtClean="0"/>
+              <a:rPr lang="en-US" dirty="0"/>
               <a:t>“</a:t>
             </a:r>
             <a:r>
-              <a:rPr lang="en-US" altLang="en-US" dirty="0" smtClean="0"/>
-              <a:t>de </a:t>
-            </a:r>
-            <a:r>
               <a:rPr lang="en-US" altLang="en-US" dirty="0"/>
-              <a:t>Facto standard for high speed/high resolution </a:t>
-            </a:r>
-            <a:r>
-              <a:rPr lang="en-US" altLang="en-US" dirty="0" smtClean="0"/>
-              <a:t>imaging”</a:t>
-            </a:r>
-          </a:p>
-          <a:p>
-            <a:r>
-              <a:rPr lang="en-US" altLang="en-US" dirty="0" smtClean="0"/>
+              <a:t>de Facto standard for high speed/high resolution imaging”</a:t>
+            </a:r>
+          </a:p>
+          <a:p>
+            <a:r>
+              <a:rPr lang="en-US" altLang="en-US" dirty="0"/>
               <a:t>Test Pattern Options</a:t>
             </a:r>
           </a:p>
@@ -25015,68 +24922,42 @@
               <a:rPr lang="en-US" altLang="en-US" dirty="0">
                 <a:hlinkClick r:id="rId4"/>
               </a:rPr>
-              <a:t>https://</a:t>
-            </a:r>
-            <a:r>
-              <a:rPr lang="en-US" altLang="en-US" dirty="0" smtClean="0">
-                <a:hlinkClick r:id="rId4"/>
-              </a:rPr>
-              <a:t>www.xilinx.com/support/documentation/ip_documentation/v_tpg/v7_0/pg103-v-tpg.pdf</a:t>
-            </a:r>
-            <a:endParaRPr lang="en-US" altLang="en-US" dirty="0" smtClean="0"/>
+              <a:t>https://www.xilinx.com/support/documentation/ip_documentation/v_tpg/v7_0/pg103-v-tpg.pdf</a:t>
+            </a:r>
+            <a:endParaRPr lang="en-US" altLang="en-US" dirty="0"/>
           </a:p>
           <a:p>
             <a:pPr lvl="1"/>
             <a:r>
-              <a:rPr lang="en-US" altLang="en-US" dirty="0" smtClean="0"/>
+              <a:rPr lang="en-US" altLang="en-US" dirty="0"/>
               <a:t>Describes Example Test Patterns</a:t>
             </a:r>
           </a:p>
           <a:p>
             <a:pPr lvl="1"/>
             <a:r>
-              <a:rPr lang="en-US" altLang="en-US" dirty="0" smtClean="0"/>
+              <a:rPr lang="en-US" altLang="en-US" dirty="0"/>
               <a:t>Generic Overview Of Test Pattern Generation</a:t>
             </a:r>
           </a:p>
           <a:p>
             <a:pPr lvl="1"/>
             <a:r>
-              <a:rPr lang="en-US" altLang="en-US" dirty="0" smtClean="0"/>
+              <a:rPr lang="en-US" altLang="en-US" dirty="0"/>
               <a:t>Generic Overview Of Frame Control Signals</a:t>
             </a:r>
           </a:p>
           <a:p>
             <a:pPr lvl="1"/>
             <a:r>
-              <a:rPr lang="en-US" altLang="en-US" dirty="0" smtClean="0"/>
+              <a:rPr lang="en-US" altLang="en-US" dirty="0"/>
               <a:t>“</a:t>
             </a:r>
             <a:r>
-              <a:rPr lang="en-US" dirty="0" smtClean="0"/>
-              <a:t>Test patterns can </a:t>
-            </a:r>
-            <a:r>
               <a:rPr lang="en-US" dirty="0"/>
-              <a:t>be used to evaluate and debug color, quality, edge, and motion performance, </a:t>
-            </a:r>
-            <a:r>
-              <a:rPr lang="en-US" dirty="0" smtClean="0"/>
-              <a:t>debug and </a:t>
-            </a:r>
-            <a:r>
-              <a:rPr lang="en-US" dirty="0"/>
-              <a:t>assess video system color, quality, edge, and motion performance of a system, or </a:t>
-            </a:r>
-            <a:r>
-              <a:rPr lang="en-US" dirty="0" smtClean="0"/>
-              <a:t>stress the </a:t>
-            </a:r>
-            <a:r>
-              <a:rPr lang="en-US" dirty="0"/>
-              <a:t>video processing to ensure proper functionality.</a:t>
-            </a:r>
-            <a:endParaRPr lang="en-US" altLang="en-US" dirty="0" smtClean="0"/>
+              <a:t>Test patterns can be used to evaluate and debug color, quality, edge, and motion performance, debug and assess video system color, quality, edge, and motion performance of a system, or stress the video processing to ensure proper functionality.</a:t>
+            </a:r>
+            <a:endParaRPr lang="en-US" altLang="en-US" dirty="0"/>
           </a:p>
           <a:p>
             <a:pPr lvl="1"/>
@@ -25314,13 +25195,6 @@
   <p:clrMapOvr>
     <a:masterClrMapping/>
   </p:clrMapOvr>
-  <p:timing>
-    <p:tnLst>
-      <p:par>
-        <p:cTn id="1" dur="indefinite" restart="never" nodeType="tmRoot"/>
-      </p:par>
-    </p:tnLst>
-  </p:timing>
 </p:sld>
 </file>
 
@@ -25391,13 +25265,8 @@
           <a:p>
             <a:r>
               <a:rPr lang="en-US" dirty="0"/>
-              <a:t>Prior </a:t>
-            </a:r>
-            <a:r>
-              <a:rPr lang="en-US" dirty="0" smtClean="0"/>
-              <a:t>Work – Cont.</a:t>
-            </a:r>
-            <a:endParaRPr lang="en-US" dirty="0"/>
+              <a:t>Prior Work – Cont.</a:t>
+            </a:r>
           </a:p>
         </p:txBody>
       </p:sp>
@@ -25485,10 +25354,9 @@
           <a:lstStyle/>
           <a:p>
             <a:r>
-              <a:rPr lang="en-US" dirty="0" smtClean="0"/>
+              <a:rPr lang="en-US" dirty="0"/>
               <a:t>Transpose Circuit</a:t>
             </a:r>
-            <a:endParaRPr lang="en-US" dirty="0"/>
           </a:p>
         </p:txBody>
       </p:sp>
@@ -25515,7 +25383,7 @@
           <a:lstStyle/>
           <a:p>
             <a:r>
-              <a:rPr lang="en-US" dirty="0" smtClean="0"/>
+              <a:rPr lang="en-US" dirty="0"/>
               <a:t>Transpose</a:t>
             </a:r>
           </a:p>
@@ -25546,10 +25414,9 @@
           <a:lstStyle/>
           <a:p>
             <a:r>
-              <a:rPr lang="en-US" dirty="0" smtClean="0"/>
+              <a:rPr lang="en-US" dirty="0"/>
               <a:t>Edge Detection</a:t>
             </a:r>
-            <a:endParaRPr lang="en-US" dirty="0"/>
           </a:p>
         </p:txBody>
       </p:sp>
@@ -25631,13 +25498,6 @@
   <p:clrMapOvr>
     <a:masterClrMapping/>
   </p:clrMapOvr>
-  <p:timing>
-    <p:tnLst>
-      <p:par>
-        <p:cTn id="1" dur="indefinite" restart="never" nodeType="tmRoot"/>
-      </p:par>
-    </p:tnLst>
-  </p:timing>
 </p:sld>
 </file>
 
@@ -25708,15 +25568,7 @@
           <a:p>
             <a:r>
               <a:rPr lang="en-US" dirty="0"/>
-              <a:t>Prior </a:t>
-            </a:r>
-            <a:r>
-              <a:rPr lang="en-US" dirty="0" smtClean="0"/>
-              <a:t>Work – Cont</a:t>
-            </a:r>
-            <a:r>
-              <a:rPr lang="en-US" dirty="0"/>
-              <a:t>.</a:t>
+              <a:t>Prior Work – Cont.</a:t>
             </a:r>
           </a:p>
         </p:txBody>
@@ -26090,10 +25942,9 @@
           </a:lstStyle>
           <a:p>
             <a:r>
-              <a:rPr lang="en-US" dirty="0" smtClean="0"/>
+              <a:rPr lang="en-US" dirty="0"/>
               <a:t>VGA Formatter</a:t>
             </a:r>
-            <a:endParaRPr lang="en-US" dirty="0"/>
           </a:p>
         </p:txBody>
       </p:sp>
@@ -26108,7 +25959,7 @@
         <p:spPr>
           <a:xfrm>
             <a:off x="468267" y="1732543"/>
-            <a:ext cx="9834671" cy="2022112"/>
+            <a:ext cx="9834671" cy="3149850"/>
           </a:xfrm>
           <a:prstGeom prst="rect">
             <a:avLst/>
@@ -26116,7 +25967,7 @@
         </p:spPr>
         <p:txBody>
           <a:bodyPr vert="horz" lIns="91440" tIns="45720" rIns="91440" bIns="45720" rtlCol="0">
-            <a:normAutofit/>
+            <a:normAutofit fontScale="85000" lnSpcReduction="10000"/>
           </a:bodyPr>
           <a:lstStyle>
             <a:lvl1pPr marL="182880" indent="-182880" algn="l" defTabSz="914400" rtl="0" eaLnBrk="1" latinLnBrk="0" hangingPunct="1">
@@ -26362,12 +26213,91 @@
           </a:lstStyle>
           <a:p>
             <a:r>
-              <a:rPr lang="en-US" dirty="0" smtClean="0"/>
-              <a:t>VGA</a:t>
+              <a:rPr lang="en-US" dirty="0"/>
+              <a:t>VGA Signal Timing</a:t>
             </a:r>
           </a:p>
           <a:p>
             <a:pPr lvl="1"/>
+            <a:r>
+              <a:rPr lang="en-US" dirty="0">
+                <a:hlinkClick r:id="rId4"/>
+              </a:rPr>
+              <a:t>http://tinyvga.com/vga-timing</a:t>
+            </a:r>
+            <a:endParaRPr lang="en-US" dirty="0"/>
+          </a:p>
+          <a:p>
+            <a:pPr lvl="1"/>
+            <a:r>
+              <a:rPr lang="en-US" altLang="en-US" dirty="0"/>
+              <a:t>Numbers for Pixel Clock, Front Porch, Back Porch, and Sync Pulses</a:t>
+            </a:r>
+          </a:p>
+          <a:p>
+            <a:pPr lvl="1"/>
+            <a:r>
+              <a:rPr lang="en-US" altLang="en-US" dirty="0"/>
+              <a:t>Polarity of Sync Pulses</a:t>
+            </a:r>
+          </a:p>
+          <a:p>
+            <a:r>
+              <a:rPr lang="en-US" altLang="en-US" dirty="0"/>
+              <a:t>VGA Theory</a:t>
+            </a:r>
+          </a:p>
+          <a:p>
+            <a:pPr lvl="1"/>
+            <a:r>
+              <a:rPr lang="en-US" altLang="en-US" dirty="0">
+                <a:hlinkClick r:id="rId5"/>
+              </a:rPr>
+              <a:t>https://eewiki.net/pages/viewpage.action?pageId=15925278</a:t>
+            </a:r>
+            <a:endParaRPr lang="en-US" altLang="en-US" dirty="0"/>
+          </a:p>
+          <a:p>
+            <a:pPr lvl="1"/>
+            <a:r>
+              <a:rPr lang="en-US" altLang="en-US" dirty="0">
+                <a:hlinkClick r:id="rId6"/>
+              </a:rPr>
+              <a:t>https://en.wikipedia.org/wiki/Video_Graphics_Array</a:t>
+            </a:r>
+            <a:endParaRPr lang="en-US" altLang="en-US" dirty="0"/>
+          </a:p>
+          <a:p>
+            <a:pPr lvl="1"/>
+            <a:r>
+              <a:rPr lang="en-US" altLang="en-US" dirty="0"/>
+              <a:t>Rescan Timing</a:t>
+            </a:r>
+          </a:p>
+          <a:p>
+            <a:pPr lvl="1"/>
+            <a:r>
+              <a:rPr lang="en-US" altLang="en-US" dirty="0"/>
+              <a:t>Color Depth</a:t>
+            </a:r>
+          </a:p>
+          <a:p>
+            <a:r>
+              <a:rPr lang="en-US" altLang="en-US" dirty="0"/>
+              <a:t>VGA HDL Reference (Different Resolution)</a:t>
+            </a:r>
+          </a:p>
+          <a:p>
+            <a:pPr lvl="1"/>
+            <a:r>
+              <a:rPr lang="en-US" altLang="en-US" dirty="0">
+                <a:hlinkClick r:id="rId7"/>
+              </a:rPr>
+              <a:t>https://reference.digilentinc.com/learn/programmable-logic/tutorials/basys-3-general-io/start</a:t>
+            </a:r>
+            <a:endParaRPr lang="en-US" altLang="en-US" dirty="0"/>
+          </a:p>
+          <a:p>
             <a:endParaRPr lang="en-US" altLang="en-US" dirty="0"/>
           </a:p>
         </p:txBody>
@@ -26608,7 +26538,7 @@
   <a:extraClrSchemeLst/>
   <a:extLst>
     <a:ext uri="{05A4C25C-085E-4340-85A3-A5531E510DB2}">
-      <thm15:themeFamily xmlns:thm15="http://schemas.microsoft.com/office/thememl/2012/main" xmlns="" name="Wood Type" id="{7ACABC62-BF99-48CF-A9DC-4DB89C7B13DC}" vid="{142A1326-48AB-42A9-8428-CB14AA30176D}"/>
+      <thm15:themeFamily xmlns:thm15="http://schemas.microsoft.com/office/thememl/2012/main" name="Wood Type" id="{7ACABC62-BF99-48CF-A9DC-4DB89C7B13DC}" vid="{142A1326-48AB-42A9-8428-CB14AA30176D}"/>
     </a:ext>
   </a:extLst>
 </a:theme>

</xml_diff>